<commit_message>
Update Social Media Strategie
</commit_message>
<xml_diff>
--- a/documents/marketing/Social Media Marketingkonzept/Marketingstrategie - Social Media (5.7).pptx
+++ b/documents/marketing/Social Media Marketingkonzept/Marketingstrategie - Social Media (5.7).pptx
@@ -4771,7 +4771,7 @@
         <p:spPr>
           <a:xfrm>
             <a:off x="457200" y="1608460"/>
-            <a:ext cx="8931820" cy="1200329"/>
+            <a:ext cx="8931820" cy="3046988"/>
           </a:xfrm>
           <a:prstGeom prst="rect">
             <a:avLst/>
@@ -4792,10 +4792,52 @@
             </a:r>
           </a:p>
           <a:p>
-            <a:endParaRPr lang="de-DE" sz="2400" dirty="0" smtClean="0">
+            <a:endParaRPr lang="de-DE" sz="2400" b="1" dirty="0" smtClean="0">
               <a:latin typeface="Arial" panose="020B0604020202020204" pitchFamily="34" charset="0"/>
               <a:cs typeface="Arial" panose="020B0604020202020204" pitchFamily="34" charset="0"/>
             </a:endParaRPr>
+          </a:p>
+          <a:p>
+            <a:r>
+              <a:rPr lang="de-DE" sz="2400" dirty="0" smtClean="0">
+                <a:latin typeface="Arial" panose="020B0604020202020204" pitchFamily="34" charset="0"/>
+                <a:cs typeface="Arial" panose="020B0604020202020204" pitchFamily="34" charset="0"/>
+              </a:rPr>
+              <a:t>Menschen aus Stuttgart und der Umgebung, </a:t>
+            </a:r>
+          </a:p>
+          <a:p>
+            <a:endParaRPr lang="de-DE" sz="2400" dirty="0">
+              <a:latin typeface="Arial" panose="020B0604020202020204" pitchFamily="34" charset="0"/>
+              <a:cs typeface="Arial" panose="020B0604020202020204" pitchFamily="34" charset="0"/>
+            </a:endParaRPr>
+          </a:p>
+          <a:p>
+            <a:r>
+              <a:rPr lang="de-DE" sz="2400" dirty="0" smtClean="0">
+                <a:latin typeface="Arial" panose="020B0604020202020204" pitchFamily="34" charset="0"/>
+                <a:cs typeface="Arial" panose="020B0604020202020204" pitchFamily="34" charset="0"/>
+              </a:rPr>
+              <a:t>Aktiv auf mindestens einem sozialen Netzwerk</a:t>
+            </a:r>
+          </a:p>
+          <a:p>
+            <a:r>
+              <a:rPr lang="de-DE" sz="2400" dirty="0" smtClean="0">
+                <a:latin typeface="Arial" panose="020B0604020202020204" pitchFamily="34" charset="0"/>
+                <a:cs typeface="Arial" panose="020B0604020202020204" pitchFamily="34" charset="0"/>
+              </a:rPr>
+              <a:t> </a:t>
+            </a:r>
+          </a:p>
+          <a:p>
+            <a:r>
+              <a:rPr lang="de-DE" sz="2400" dirty="0" smtClean="0">
+                <a:latin typeface="Arial" panose="020B0604020202020204" pitchFamily="34" charset="0"/>
+                <a:cs typeface="Arial" panose="020B0604020202020204" pitchFamily="34" charset="0"/>
+              </a:rPr>
+              <a:t>Altersgruppe 18 - 30</a:t>
+            </a:r>
           </a:p>
           <a:p>
             <a:endParaRPr lang="de-DE" sz="2400" dirty="0"/>
@@ -5118,7 +5160,7 @@
         <p:spPr>
           <a:xfrm>
             <a:off x="457200" y="1608460"/>
-            <a:ext cx="8931820" cy="1200329"/>
+            <a:ext cx="8229600" cy="4524315"/>
           </a:xfrm>
           <a:prstGeom prst="rect">
             <a:avLst/>
@@ -5139,6 +5181,101 @@
             </a:r>
           </a:p>
           <a:p>
+            <a:endParaRPr lang="de-DE" sz="2400" dirty="0" smtClean="0">
+              <a:latin typeface="Arial" panose="020B0604020202020204" pitchFamily="34" charset="0"/>
+              <a:cs typeface="Arial" panose="020B0604020202020204" pitchFamily="34" charset="0"/>
+            </a:endParaRPr>
+          </a:p>
+          <a:p>
+            <a:r>
+              <a:rPr lang="de-DE" sz="2400" dirty="0" smtClean="0">
+                <a:latin typeface="Arial" panose="020B0604020202020204" pitchFamily="34" charset="0"/>
+                <a:cs typeface="Arial" panose="020B0604020202020204" pitchFamily="34" charset="0"/>
+              </a:rPr>
+              <a:t>Facebook</a:t>
+            </a:r>
+          </a:p>
+          <a:p>
+            <a:pPr marL="342900" indent="-342900">
+              <a:buFont typeface="Symbol" panose="05050102010706020507" pitchFamily="18" charset="2"/>
+              <a:buChar char="-"/>
+            </a:pPr>
+            <a:r>
+              <a:rPr lang="de-DE" sz="2400" dirty="0" smtClean="0">
+                <a:latin typeface="Arial" panose="020B0604020202020204" pitchFamily="34" charset="0"/>
+                <a:cs typeface="Arial" panose="020B0604020202020204" pitchFamily="34" charset="0"/>
+              </a:rPr>
+              <a:t>Mit 1,39 Milliarden aktiven Nutzern weltweit und 28 Millionen aktiven Nutzern in Deutschland, ist </a:t>
+            </a:r>
+            <a:r>
+              <a:rPr lang="de-DE" sz="2400" dirty="0" err="1" smtClean="0">
+                <a:latin typeface="Arial" panose="020B0604020202020204" pitchFamily="34" charset="0"/>
+                <a:cs typeface="Arial" panose="020B0604020202020204" pitchFamily="34" charset="0"/>
+              </a:rPr>
+              <a:t>facebook</a:t>
+            </a:r>
+            <a:r>
+              <a:rPr lang="de-DE" sz="2400" dirty="0" smtClean="0">
+                <a:latin typeface="Arial" panose="020B0604020202020204" pitchFamily="34" charset="0"/>
+                <a:cs typeface="Arial" panose="020B0604020202020204" pitchFamily="34" charset="0"/>
+              </a:rPr>
+              <a:t> das größte soziale Netzwerk</a:t>
+            </a:r>
+          </a:p>
+          <a:p>
+            <a:endParaRPr lang="de-DE" sz="2400" dirty="0">
+              <a:latin typeface="Arial" panose="020B0604020202020204" pitchFamily="34" charset="0"/>
+              <a:cs typeface="Arial" panose="020B0604020202020204" pitchFamily="34" charset="0"/>
+            </a:endParaRPr>
+          </a:p>
+          <a:p>
+            <a:r>
+              <a:rPr lang="de-DE" sz="2400" dirty="0" smtClean="0">
+                <a:latin typeface="Arial" panose="020B0604020202020204" pitchFamily="34" charset="0"/>
+                <a:cs typeface="Arial" panose="020B0604020202020204" pitchFamily="34" charset="0"/>
+              </a:rPr>
+              <a:t>Instagram</a:t>
+            </a:r>
+          </a:p>
+          <a:p>
+            <a:pPr marL="342900" indent="-342900">
+              <a:buFont typeface="Symbol" panose="05050102010706020507" pitchFamily="18" charset="2"/>
+              <a:buChar char="-"/>
+            </a:pPr>
+            <a:r>
+              <a:rPr lang="de-DE" sz="2400" dirty="0" smtClean="0">
+                <a:latin typeface="Arial" panose="020B0604020202020204" pitchFamily="34" charset="0"/>
+                <a:cs typeface="Arial" panose="020B0604020202020204" pitchFamily="34" charset="0"/>
+              </a:rPr>
+              <a:t>Die </a:t>
+            </a:r>
+            <a:r>
+              <a:rPr lang="de-DE" sz="2400" dirty="0" smtClean="0">
+                <a:latin typeface="Arial" panose="020B0604020202020204" pitchFamily="34" charset="0"/>
+                <a:cs typeface="Arial" panose="020B0604020202020204" pitchFamily="34" charset="0"/>
+              </a:rPr>
+              <a:t>auf das Teilen von Bildern basierende Plattform e</a:t>
+            </a:r>
+            <a:r>
+              <a:rPr lang="de-DE" sz="2400" dirty="0" smtClean="0">
+                <a:latin typeface="Arial" panose="020B0604020202020204" pitchFamily="34" charset="0"/>
+                <a:cs typeface="Arial" panose="020B0604020202020204" pitchFamily="34" charset="0"/>
+              </a:rPr>
+              <a:t>rfreut sich in den letzten Jahren einem großen Zulauf.</a:t>
+            </a:r>
+          </a:p>
+          <a:p>
+            <a:pPr marL="342900" indent="-342900">
+              <a:buFont typeface="Symbol" panose="05050102010706020507" pitchFamily="18" charset="2"/>
+              <a:buChar char="-"/>
+            </a:pPr>
+            <a:r>
+              <a:rPr lang="de-DE" sz="2400" dirty="0" smtClean="0">
+                <a:latin typeface="Arial" panose="020B0604020202020204" pitchFamily="34" charset="0"/>
+                <a:cs typeface="Arial" panose="020B0604020202020204" pitchFamily="34" charset="0"/>
+              </a:rPr>
+              <a:t>Aktuell 3,1 Millionen aktive Nutzer in Deutschland</a:t>
+            </a:r>
             <a:endParaRPr lang="de-DE" sz="2400" dirty="0" smtClean="0">
               <a:latin typeface="Arial" panose="020B0604020202020204" pitchFamily="34" charset="0"/>
               <a:cs typeface="Arial" panose="020B0604020202020204" pitchFamily="34" charset="0"/>

</xml_diff>

<commit_message>
Version 1.0 Social Media Marketingkonzept
</commit_message>
<xml_diff>
--- a/documents/marketing/Social Media Marketingkonzept/Marketingstrategie - Social Media (5.7).pptx
+++ b/documents/marketing/Social Media Marketingkonzept/Marketingstrategie - Social Media (5.7).pptx
@@ -5,7 +5,7 @@
     <p:sldMasterId id="2147483648" r:id="rId1"/>
   </p:sldMasterIdLst>
   <p:notesMasterIdLst>
-    <p:notesMasterId r:id="rId17"/>
+    <p:notesMasterId r:id="rId20"/>
   </p:notesMasterIdLst>
   <p:sldIdLst>
     <p:sldId id="256" r:id="rId2"/>
@@ -20,9 +20,12 @@
     <p:sldId id="338" r:id="rId11"/>
     <p:sldId id="341" r:id="rId12"/>
     <p:sldId id="342" r:id="rId13"/>
-    <p:sldId id="345" r:id="rId14"/>
-    <p:sldId id="344" r:id="rId15"/>
-    <p:sldId id="319" r:id="rId16"/>
+    <p:sldId id="348" r:id="rId14"/>
+    <p:sldId id="345" r:id="rId15"/>
+    <p:sldId id="344" r:id="rId16"/>
+    <p:sldId id="346" r:id="rId17"/>
+    <p:sldId id="347" r:id="rId18"/>
+    <p:sldId id="319" r:id="rId19"/>
   </p:sldIdLst>
   <p:sldSz cx="9144000" cy="6858000" type="screen4x3"/>
   <p:notesSz cx="6858000" cy="9144000"/>
@@ -150,8 +153,11 @@
         <p14:section name="Strategie" id="{2302A5A9-BB0B-47F5-82D4-9DF1CCDF2637}">
           <p14:sldIdLst>
             <p14:sldId id="342"/>
+            <p14:sldId id="348"/>
             <p14:sldId id="345"/>
             <p14:sldId id="344"/>
+            <p14:sldId id="346"/>
+            <p14:sldId id="347"/>
           </p14:sldIdLst>
         </p14:section>
         <p14:section name="Erkenntnisse" id="{1F5D3F0E-2E10-417D-B3B3-F875A4E86560}">
@@ -4771,7 +4777,7 @@
         <p:spPr>
           <a:xfrm>
             <a:off x="457200" y="1608460"/>
-            <a:ext cx="8931820" cy="3046988"/>
+            <a:ext cx="8229600" cy="4524315"/>
           </a:xfrm>
           <a:prstGeom prst="rect">
             <a:avLst/>
@@ -4788,6 +4794,34 @@
                 <a:latin typeface="Arial" panose="020B0604020202020204" pitchFamily="34" charset="0"/>
                 <a:cs typeface="Arial" panose="020B0604020202020204" pitchFamily="34" charset="0"/>
               </a:rPr>
+              <a:t>Ziele der Strategie:</a:t>
+            </a:r>
+          </a:p>
+          <a:p>
+            <a:r>
+              <a:rPr lang="de-DE" sz="2400" dirty="0" smtClean="0">
+                <a:latin typeface="Arial" panose="020B0604020202020204" pitchFamily="34" charset="0"/>
+                <a:cs typeface="Arial" panose="020B0604020202020204" pitchFamily="34" charset="0"/>
+              </a:rPr>
+              <a:t>Multiplikation der Bekanntheit der Anwendung und Dialog mit den bestehenden Nutzern.</a:t>
+            </a:r>
+            <a:endParaRPr lang="de-DE" sz="2400" dirty="0" smtClean="0">
+              <a:latin typeface="Arial" panose="020B0604020202020204" pitchFamily="34" charset="0"/>
+              <a:cs typeface="Arial" panose="020B0604020202020204" pitchFamily="34" charset="0"/>
+            </a:endParaRPr>
+          </a:p>
+          <a:p>
+            <a:endParaRPr lang="de-DE" sz="2400" b="1" dirty="0">
+              <a:latin typeface="Arial" panose="020B0604020202020204" pitchFamily="34" charset="0"/>
+              <a:cs typeface="Arial" panose="020B0604020202020204" pitchFamily="34" charset="0"/>
+            </a:endParaRPr>
+          </a:p>
+          <a:p>
+            <a:r>
+              <a:rPr lang="de-DE" sz="2400" b="1" dirty="0" smtClean="0">
+                <a:latin typeface="Arial" panose="020B0604020202020204" pitchFamily="34" charset="0"/>
+                <a:cs typeface="Arial" panose="020B0604020202020204" pitchFamily="34" charset="0"/>
+              </a:rPr>
               <a:t>Zielgruppe:</a:t>
             </a:r>
           </a:p>
@@ -4803,7 +4837,7 @@
                 <a:latin typeface="Arial" panose="020B0604020202020204" pitchFamily="34" charset="0"/>
                 <a:cs typeface="Arial" panose="020B0604020202020204" pitchFamily="34" charset="0"/>
               </a:rPr>
-              <a:t>Menschen aus Stuttgart und der Umgebung, </a:t>
+              <a:t>Frauen und Männer aus Stuttgart und der Umgebung</a:t>
             </a:r>
           </a:p>
           <a:p>
@@ -5160,7 +5194,7 @@
         <p:spPr>
           <a:xfrm>
             <a:off x="457200" y="1608460"/>
-            <a:ext cx="8229600" cy="4524315"/>
+            <a:ext cx="8229600" cy="3046988"/>
           </a:xfrm>
           <a:prstGeom prst="rect">
             <a:avLst/>
@@ -5181,7 +5215,7 @@
             </a:r>
           </a:p>
           <a:p>
-            <a:endParaRPr lang="de-DE" sz="2400" dirty="0" smtClean="0">
+            <a:endParaRPr lang="de-DE" sz="2400" b="1" dirty="0" smtClean="0">
               <a:latin typeface="Arial" panose="020B0604020202020204" pitchFamily="34" charset="0"/>
               <a:cs typeface="Arial" panose="020B0604020202020204" pitchFamily="34" charset="0"/>
             </a:endParaRPr>
@@ -5205,36 +5239,7 @@
                 <a:latin typeface="Arial" panose="020B0604020202020204" pitchFamily="34" charset="0"/>
                 <a:cs typeface="Arial" panose="020B0604020202020204" pitchFamily="34" charset="0"/>
               </a:rPr>
-              <a:t>Mit 1,39 Milliarden aktiven Nutzern weltweit und 28 Millionen aktiven Nutzern in Deutschland, ist </a:t>
-            </a:r>
-            <a:r>
-              <a:rPr lang="de-DE" sz="2400" dirty="0" err="1" smtClean="0">
-                <a:latin typeface="Arial" panose="020B0604020202020204" pitchFamily="34" charset="0"/>
-                <a:cs typeface="Arial" panose="020B0604020202020204" pitchFamily="34" charset="0"/>
-              </a:rPr>
-              <a:t>facebook</a:t>
-            </a:r>
-            <a:r>
-              <a:rPr lang="de-DE" sz="2400" dirty="0" smtClean="0">
-                <a:latin typeface="Arial" panose="020B0604020202020204" pitchFamily="34" charset="0"/>
-                <a:cs typeface="Arial" panose="020B0604020202020204" pitchFamily="34" charset="0"/>
-              </a:rPr>
-              <a:t> das größte soziale Netzwerk</a:t>
-            </a:r>
-          </a:p>
-          <a:p>
-            <a:endParaRPr lang="de-DE" sz="2400" dirty="0">
-              <a:latin typeface="Arial" panose="020B0604020202020204" pitchFamily="34" charset="0"/>
-              <a:cs typeface="Arial" panose="020B0604020202020204" pitchFamily="34" charset="0"/>
-            </a:endParaRPr>
-          </a:p>
-          <a:p>
-            <a:r>
-              <a:rPr lang="de-DE" sz="2400" dirty="0" smtClean="0">
-                <a:latin typeface="Arial" panose="020B0604020202020204" pitchFamily="34" charset="0"/>
-                <a:cs typeface="Arial" panose="020B0604020202020204" pitchFamily="34" charset="0"/>
-              </a:rPr>
-              <a:t>Instagram</a:t>
+              <a:t>Mit 1,39 Milliarden aktiven Nutzern weltweit und 28 Millionen aktiven Nutzern in Deutschland, ist Facebook das aktuell größte soziale Netzwerk</a:t>
             </a:r>
           </a:p>
           <a:p>
@@ -5247,49 +5252,15 @@
                 <a:latin typeface="Arial" panose="020B0604020202020204" pitchFamily="34" charset="0"/>
                 <a:cs typeface="Arial" panose="020B0604020202020204" pitchFamily="34" charset="0"/>
               </a:rPr>
-              <a:t>Die </a:t>
-            </a:r>
-            <a:r>
-              <a:rPr lang="de-DE" sz="2400" dirty="0" smtClean="0">
-                <a:latin typeface="Arial" panose="020B0604020202020204" pitchFamily="34" charset="0"/>
-                <a:cs typeface="Arial" panose="020B0604020202020204" pitchFamily="34" charset="0"/>
-              </a:rPr>
-              <a:t>auf das Teilen von Bildern basierende Plattform e</a:t>
-            </a:r>
-            <a:r>
-              <a:rPr lang="de-DE" sz="2400" dirty="0" smtClean="0">
-                <a:latin typeface="Arial" panose="020B0604020202020204" pitchFamily="34" charset="0"/>
-                <a:cs typeface="Arial" panose="020B0604020202020204" pitchFamily="34" charset="0"/>
-              </a:rPr>
-              <a:t>rfreut sich in den letzten Jahren einem großen Zulauf.</a:t>
-            </a:r>
-          </a:p>
-          <a:p>
-            <a:pPr marL="342900" indent="-342900">
-              <a:buFont typeface="Symbol" panose="05050102010706020507" pitchFamily="18" charset="2"/>
-              <a:buChar char="-"/>
-            </a:pPr>
-            <a:r>
-              <a:rPr lang="de-DE" sz="2400" dirty="0" smtClean="0">
-                <a:latin typeface="Arial" panose="020B0604020202020204" pitchFamily="34" charset="0"/>
-                <a:cs typeface="Arial" panose="020B0604020202020204" pitchFamily="34" charset="0"/>
-              </a:rPr>
-              <a:t>Aktuell 3,1 Millionen aktive Nutzer in Deutschland</a:t>
-            </a:r>
-            <a:endParaRPr lang="de-DE" sz="2400" dirty="0" smtClean="0">
-              <a:latin typeface="Arial" panose="020B0604020202020204" pitchFamily="34" charset="0"/>
-              <a:cs typeface="Arial" panose="020B0604020202020204" pitchFamily="34" charset="0"/>
-            </a:endParaRPr>
-          </a:p>
-          <a:p>
-            <a:endParaRPr lang="de-DE" sz="2400" dirty="0"/>
+              <a:t>Es bietet die Möglichkeit Hashtags zu benutzen, Freunde zu verlinken und sich bei Orten einzuchecken</a:t>
+            </a:r>
           </a:p>
         </p:txBody>
       </p:sp>
     </p:spTree>
     <p:extLst>
       <p:ext uri="{BB962C8B-B14F-4D97-AF65-F5344CB8AC3E}">
-        <p14:creationId xmlns:p14="http://schemas.microsoft.com/office/powerpoint/2010/main" val="3531306027"/>
+        <p14:creationId xmlns:p14="http://schemas.microsoft.com/office/powerpoint/2010/main" val="3225485694"/>
       </p:ext>
     </p:extLst>
   </p:cSld>
@@ -5602,7 +5573,7 @@
         <p:spPr>
           <a:xfrm>
             <a:off x="457200" y="1608460"/>
-            <a:ext cx="8931820" cy="3785652"/>
+            <a:ext cx="8229600" cy="3785652"/>
           </a:xfrm>
           <a:prstGeom prst="rect">
             <a:avLst/>
@@ -5619,7 +5590,7 @@
                 <a:latin typeface="Arial" panose="020B0604020202020204" pitchFamily="34" charset="0"/>
                 <a:cs typeface="Arial" panose="020B0604020202020204" pitchFamily="34" charset="0"/>
               </a:rPr>
-              <a:t>Aktionen:</a:t>
+              <a:t>Plattformen:</a:t>
             </a:r>
           </a:p>
           <a:p>
@@ -5634,73 +5605,75 @@
                 <a:latin typeface="Arial" panose="020B0604020202020204" pitchFamily="34" charset="0"/>
                 <a:cs typeface="Arial" panose="020B0604020202020204" pitchFamily="34" charset="0"/>
               </a:rPr>
-              <a:t>#</a:t>
-            </a:r>
-            <a:r>
-              <a:rPr lang="de-DE" sz="2400" dirty="0" err="1" smtClean="0">
-                <a:latin typeface="Arial" panose="020B0604020202020204" pitchFamily="34" charset="0"/>
-                <a:cs typeface="Arial" panose="020B0604020202020204" pitchFamily="34" charset="0"/>
-              </a:rPr>
-              <a:t>goHappy</a:t>
-            </a:r>
-            <a:endParaRPr lang="de-DE" sz="2400" dirty="0" smtClean="0">
-              <a:latin typeface="Arial" panose="020B0604020202020204" pitchFamily="34" charset="0"/>
-              <a:cs typeface="Arial" panose="020B0604020202020204" pitchFamily="34" charset="0"/>
-            </a:endParaRPr>
-          </a:p>
-          <a:p>
-            <a:endParaRPr lang="de-DE" sz="2400" dirty="0" smtClean="0">
-              <a:latin typeface="Arial" panose="020B0604020202020204" pitchFamily="34" charset="0"/>
-              <a:cs typeface="Arial" panose="020B0604020202020204" pitchFamily="34" charset="0"/>
-            </a:endParaRPr>
-          </a:p>
-          <a:p>
+              <a:t>Instagram</a:t>
+            </a:r>
+          </a:p>
+          <a:p>
+            <a:pPr marL="342900" indent="-342900">
+              <a:buFont typeface="Symbol" panose="05050102010706020507" pitchFamily="18" charset="2"/>
+              <a:buChar char="-"/>
+            </a:pPr>
+            <a:r>
+              <a:rPr lang="de-DE" sz="2400" dirty="0" smtClean="0">
+                <a:latin typeface="Arial" panose="020B0604020202020204" pitchFamily="34" charset="0"/>
+                <a:cs typeface="Arial" panose="020B0604020202020204" pitchFamily="34" charset="0"/>
+              </a:rPr>
+              <a:t>Die </a:t>
+            </a:r>
+            <a:r>
+              <a:rPr lang="de-DE" sz="2400" dirty="0" smtClean="0">
+                <a:latin typeface="Arial" panose="020B0604020202020204" pitchFamily="34" charset="0"/>
+                <a:cs typeface="Arial" panose="020B0604020202020204" pitchFamily="34" charset="0"/>
+              </a:rPr>
+              <a:t>auf dem Teilen von Bildern basierende Plattform e</a:t>
+            </a:r>
+            <a:r>
+              <a:rPr lang="de-DE" sz="2400" dirty="0" smtClean="0">
+                <a:latin typeface="Arial" panose="020B0604020202020204" pitchFamily="34" charset="0"/>
+                <a:cs typeface="Arial" panose="020B0604020202020204" pitchFamily="34" charset="0"/>
+              </a:rPr>
+              <a:t>rfreut sich in den letzten Jahren einem immer größeren Zulauf</a:t>
+            </a:r>
+          </a:p>
+          <a:p>
+            <a:pPr marL="342900" indent="-342900">
+              <a:buFont typeface="Symbol" panose="05050102010706020507" pitchFamily="18" charset="2"/>
+              <a:buChar char="-"/>
+            </a:pPr>
+            <a:r>
+              <a:rPr lang="de-DE" sz="2400" dirty="0" smtClean="0">
+                <a:latin typeface="Arial" panose="020B0604020202020204" pitchFamily="34" charset="0"/>
+                <a:cs typeface="Arial" panose="020B0604020202020204" pitchFamily="34" charset="0"/>
+              </a:rPr>
+              <a:t>Aktuell hat Instagram 3,1 Millionen aktive Nutzer in Deutschland</a:t>
+            </a:r>
+          </a:p>
+          <a:p>
+            <a:pPr marL="342900" indent="-342900">
+              <a:buFont typeface="Symbol" panose="05050102010706020507" pitchFamily="18" charset="2"/>
+              <a:buChar char="-"/>
+            </a:pPr>
+            <a:r>
+              <a:rPr lang="de-DE" sz="2400" dirty="0" smtClean="0">
+                <a:latin typeface="Arial" panose="020B0604020202020204" pitchFamily="34" charset="0"/>
+                <a:cs typeface="Arial" panose="020B0604020202020204" pitchFamily="34" charset="0"/>
+              </a:rPr>
+              <a:t>Die Plattform bietet die Möglichkeit </a:t>
+            </a:r>
             <a:r>
               <a:rPr lang="de-DE" sz="2400" dirty="0">
                 <a:latin typeface="Arial" panose="020B0604020202020204" pitchFamily="34" charset="0"/>
                 <a:cs typeface="Arial" panose="020B0604020202020204" pitchFamily="34" charset="0"/>
               </a:rPr>
-              <a:t>Was macht dich happy? Schreib uns auf FB &amp; Twitter mit dem Hashtag #</a:t>
-            </a:r>
-            <a:r>
-              <a:rPr lang="de-DE" sz="2400" dirty="0" err="1" smtClean="0">
-                <a:latin typeface="Arial" panose="020B0604020202020204" pitchFamily="34" charset="0"/>
-                <a:cs typeface="Arial" panose="020B0604020202020204" pitchFamily="34" charset="0"/>
-              </a:rPr>
-              <a:t>GoHappy</a:t>
-            </a:r>
-            <a:endParaRPr lang="de-DE" sz="2400" dirty="0" smtClean="0">
-              <a:latin typeface="Arial" panose="020B0604020202020204" pitchFamily="34" charset="0"/>
-              <a:cs typeface="Arial" panose="020B0604020202020204" pitchFamily="34" charset="0"/>
-            </a:endParaRPr>
-          </a:p>
-          <a:p>
-            <a:endParaRPr lang="de-DE" sz="2400" dirty="0">
-              <a:latin typeface="Arial" panose="020B0604020202020204" pitchFamily="34" charset="0"/>
-              <a:cs typeface="Arial" panose="020B0604020202020204" pitchFamily="34" charset="0"/>
-            </a:endParaRPr>
-          </a:p>
-          <a:p>
-            <a:r>
-              <a:rPr lang="de-DE" sz="2400" dirty="0">
-                <a:latin typeface="Arial" panose="020B0604020202020204" pitchFamily="34" charset="0"/>
-                <a:cs typeface="Arial" panose="020B0604020202020204" pitchFamily="34" charset="0"/>
-              </a:rPr>
-              <a:t>Du bist mit unserem Dienst unterwegs? Teile deine Erlebnisse und Fotos mit uns unter dem #</a:t>
-            </a:r>
-            <a:r>
-              <a:rPr lang="de-DE" sz="2400" dirty="0" err="1">
-                <a:latin typeface="Arial" panose="020B0604020202020204" pitchFamily="34" charset="0"/>
-                <a:cs typeface="Arial" panose="020B0604020202020204" pitchFamily="34" charset="0"/>
-              </a:rPr>
-              <a:t>GoHappy</a:t>
-            </a:r>
-            <a:endParaRPr lang="de-DE" sz="2400" dirty="0">
-              <a:latin typeface="Arial" panose="020B0604020202020204" pitchFamily="34" charset="0"/>
-              <a:cs typeface="Arial" panose="020B0604020202020204" pitchFamily="34" charset="0"/>
-            </a:endParaRPr>
-          </a:p>
-          <a:p>
+              <a:t>Hashtags zu </a:t>
+            </a:r>
+            <a:r>
+              <a:rPr lang="de-DE" sz="2400" dirty="0" smtClean="0">
+                <a:latin typeface="Arial" panose="020B0604020202020204" pitchFamily="34" charset="0"/>
+                <a:cs typeface="Arial" panose="020B0604020202020204" pitchFamily="34" charset="0"/>
+              </a:rPr>
+              <a:t>benutzen</a:t>
+            </a:r>
             <a:endParaRPr lang="de-DE" sz="2400" dirty="0"/>
           </a:p>
         </p:txBody>
@@ -5708,7 +5681,7 @@
     </p:spTree>
     <p:extLst>
       <p:ext uri="{BB962C8B-B14F-4D97-AF65-F5344CB8AC3E}">
-        <p14:creationId xmlns:p14="http://schemas.microsoft.com/office/powerpoint/2010/main" val="3224938422"/>
+        <p14:creationId xmlns:p14="http://schemas.microsoft.com/office/powerpoint/2010/main" val="3531306027"/>
       </p:ext>
     </p:extLst>
   </p:cSld>
@@ -5744,6 +5717,1290 @@
       </p:grpSpPr>
       <p:sp>
         <p:nvSpPr>
+          <p:cNvPr id="4" name="Foliennummernplatzhalter 3"/>
+          <p:cNvSpPr>
+            <a:spLocks noGrp="1"/>
+          </p:cNvSpPr>
+          <p:nvPr>
+            <p:ph type="sldNum" sz="quarter" idx="12"/>
+          </p:nvPr>
+        </p:nvSpPr>
+        <p:spPr/>
+        <p:txBody>
+          <a:bodyPr/>
+          <a:lstStyle/>
+          <a:p>
+            <a:fld id="{6C6AE60A-B69C-4790-82F7-3882EDF23186}" type="slidenum">
+              <a:rPr lang="de-DE" smtClean="0"/>
+              <a:t>15</a:t>
+            </a:fld>
+            <a:endParaRPr lang="de-DE"/>
+          </a:p>
+        </p:txBody>
+      </p:sp>
+      <p:sp>
+        <p:nvSpPr>
+          <p:cNvPr id="5" name="Titel 1"/>
+          <p:cNvSpPr txBox="1">
+            <a:spLocks/>
+          </p:cNvSpPr>
+          <p:nvPr/>
+        </p:nvSpPr>
+        <p:spPr>
+          <a:xfrm>
+            <a:off x="457200" y="274638"/>
+            <a:ext cx="8229600" cy="1143000"/>
+          </a:xfrm>
+          <a:prstGeom prst="rect">
+            <a:avLst/>
+          </a:prstGeom>
+        </p:spPr>
+        <p:txBody>
+          <a:bodyPr vert="horz" lIns="91440" tIns="45720" rIns="91440" bIns="45720" rtlCol="0" anchor="ctr">
+            <a:normAutofit/>
+          </a:bodyPr>
+          <a:lstStyle>
+            <a:lvl1pPr algn="ctr" defTabSz="914400" rtl="0" eaLnBrk="1" latinLnBrk="0" hangingPunct="1">
+              <a:spcBef>
+                <a:spcPct val="0"/>
+              </a:spcBef>
+              <a:buNone/>
+              <a:defRPr sz="4400" kern="1200">
+                <a:solidFill>
+                  <a:schemeClr val="tx1"/>
+                </a:solidFill>
+                <a:latin typeface="+mj-lt"/>
+                <a:ea typeface="+mj-ea"/>
+                <a:cs typeface="+mj-cs"/>
+              </a:defRPr>
+            </a:lvl1pPr>
+          </a:lstStyle>
+          <a:p>
+            <a:pPr algn="l"/>
+            <a:r>
+              <a:rPr lang="de-DE" sz="2800" b="1" dirty="0" smtClean="0">
+                <a:latin typeface="Arial" panose="020B0604020202020204" pitchFamily="34" charset="0"/>
+                <a:cs typeface="Arial" panose="020B0604020202020204" pitchFamily="34" charset="0"/>
+              </a:rPr>
+              <a:t>3. </a:t>
+            </a:r>
+            <a:r>
+              <a:rPr lang="de-DE" sz="2800" b="1" dirty="0" smtClean="0">
+                <a:latin typeface="Arial" panose="020B0604020202020204" pitchFamily="34" charset="0"/>
+                <a:cs typeface="Arial" panose="020B0604020202020204" pitchFamily="34" charset="0"/>
+              </a:rPr>
+              <a:t>Social Media Strategie</a:t>
+            </a:r>
+            <a:endParaRPr lang="de-DE" sz="2800" dirty="0">
+              <a:latin typeface="Arial" panose="020B0604020202020204" pitchFamily="34" charset="0"/>
+              <a:cs typeface="Arial" panose="020B0604020202020204" pitchFamily="34" charset="0"/>
+            </a:endParaRPr>
+          </a:p>
+        </p:txBody>
+      </p:sp>
+      <p:sp>
+        <p:nvSpPr>
+          <p:cNvPr id="8" name="Inhaltsplatzhalter 5"/>
+          <p:cNvSpPr txBox="1">
+            <a:spLocks/>
+          </p:cNvSpPr>
+          <p:nvPr/>
+        </p:nvSpPr>
+        <p:spPr>
+          <a:xfrm>
+            <a:off x="457200" y="1600200"/>
+            <a:ext cx="8229600" cy="4525963"/>
+          </a:xfrm>
+          <a:prstGeom prst="rect">
+            <a:avLst/>
+          </a:prstGeom>
+          <a:ln>
+            <a:solidFill>
+              <a:schemeClr val="accent1"/>
+            </a:solidFill>
+          </a:ln>
+        </p:spPr>
+        <p:txBody>
+          <a:bodyPr vert="horz" lIns="91440" tIns="45720" rIns="91440" bIns="45720" rtlCol="0">
+            <a:normAutofit/>
+          </a:bodyPr>
+          <a:lstStyle>
+            <a:lvl1pPr marL="0" indent="0" algn="ctr" defTabSz="914400" rtl="0" eaLnBrk="1" latinLnBrk="0" hangingPunct="1">
+              <a:spcBef>
+                <a:spcPct val="20000"/>
+              </a:spcBef>
+              <a:buFont typeface="Arial" pitchFamily="34" charset="0"/>
+              <a:buNone/>
+              <a:defRPr sz="3200" kern="1200">
+                <a:solidFill>
+                  <a:schemeClr val="tx1">
+                    <a:tint val="75000"/>
+                  </a:schemeClr>
+                </a:solidFill>
+                <a:latin typeface="+mn-lt"/>
+                <a:ea typeface="+mn-ea"/>
+                <a:cs typeface="+mn-cs"/>
+              </a:defRPr>
+            </a:lvl1pPr>
+            <a:lvl2pPr marL="457200" indent="0" algn="ctr" defTabSz="914400" rtl="0" eaLnBrk="1" latinLnBrk="0" hangingPunct="1">
+              <a:spcBef>
+                <a:spcPct val="20000"/>
+              </a:spcBef>
+              <a:buFont typeface="Arial" pitchFamily="34" charset="0"/>
+              <a:buNone/>
+              <a:defRPr sz="2800" kern="1200">
+                <a:solidFill>
+                  <a:schemeClr val="tx1">
+                    <a:tint val="75000"/>
+                  </a:schemeClr>
+                </a:solidFill>
+                <a:latin typeface="+mn-lt"/>
+                <a:ea typeface="+mn-ea"/>
+                <a:cs typeface="+mn-cs"/>
+              </a:defRPr>
+            </a:lvl2pPr>
+            <a:lvl3pPr marL="914400" indent="0" algn="ctr" defTabSz="914400" rtl="0" eaLnBrk="1" latinLnBrk="0" hangingPunct="1">
+              <a:spcBef>
+                <a:spcPct val="20000"/>
+              </a:spcBef>
+              <a:buFont typeface="Arial" pitchFamily="34" charset="0"/>
+              <a:buNone/>
+              <a:defRPr sz="2400" kern="1200">
+                <a:solidFill>
+                  <a:schemeClr val="tx1">
+                    <a:tint val="75000"/>
+                  </a:schemeClr>
+                </a:solidFill>
+                <a:latin typeface="+mn-lt"/>
+                <a:ea typeface="+mn-ea"/>
+                <a:cs typeface="+mn-cs"/>
+              </a:defRPr>
+            </a:lvl3pPr>
+            <a:lvl4pPr marL="1371600" indent="0" algn="ctr" defTabSz="914400" rtl="0" eaLnBrk="1" latinLnBrk="0" hangingPunct="1">
+              <a:spcBef>
+                <a:spcPct val="20000"/>
+              </a:spcBef>
+              <a:buFont typeface="Arial" pitchFamily="34" charset="0"/>
+              <a:buNone/>
+              <a:defRPr sz="2000" kern="1200">
+                <a:solidFill>
+                  <a:schemeClr val="tx1">
+                    <a:tint val="75000"/>
+                  </a:schemeClr>
+                </a:solidFill>
+                <a:latin typeface="+mn-lt"/>
+                <a:ea typeface="+mn-ea"/>
+                <a:cs typeface="+mn-cs"/>
+              </a:defRPr>
+            </a:lvl4pPr>
+            <a:lvl5pPr marL="1828800" indent="0" algn="ctr" defTabSz="914400" rtl="0" eaLnBrk="1" latinLnBrk="0" hangingPunct="1">
+              <a:spcBef>
+                <a:spcPct val="20000"/>
+              </a:spcBef>
+              <a:buFont typeface="Arial" pitchFamily="34" charset="0"/>
+              <a:buNone/>
+              <a:defRPr sz="2000" kern="1200">
+                <a:solidFill>
+                  <a:schemeClr val="tx1">
+                    <a:tint val="75000"/>
+                  </a:schemeClr>
+                </a:solidFill>
+                <a:latin typeface="+mn-lt"/>
+                <a:ea typeface="+mn-ea"/>
+                <a:cs typeface="+mn-cs"/>
+              </a:defRPr>
+            </a:lvl5pPr>
+            <a:lvl6pPr marL="2286000" indent="0" algn="ctr" defTabSz="914400" rtl="0" eaLnBrk="1" latinLnBrk="0" hangingPunct="1">
+              <a:spcBef>
+                <a:spcPct val="20000"/>
+              </a:spcBef>
+              <a:buFont typeface="Arial" pitchFamily="34" charset="0"/>
+              <a:buNone/>
+              <a:defRPr sz="2000" kern="1200">
+                <a:solidFill>
+                  <a:schemeClr val="tx1">
+                    <a:tint val="75000"/>
+                  </a:schemeClr>
+                </a:solidFill>
+                <a:latin typeface="+mn-lt"/>
+                <a:ea typeface="+mn-ea"/>
+                <a:cs typeface="+mn-cs"/>
+              </a:defRPr>
+            </a:lvl6pPr>
+            <a:lvl7pPr marL="2743200" indent="0" algn="ctr" defTabSz="914400" rtl="0" eaLnBrk="1" latinLnBrk="0" hangingPunct="1">
+              <a:spcBef>
+                <a:spcPct val="20000"/>
+              </a:spcBef>
+              <a:buFont typeface="Arial" pitchFamily="34" charset="0"/>
+              <a:buNone/>
+              <a:defRPr sz="2000" kern="1200">
+                <a:solidFill>
+                  <a:schemeClr val="tx1">
+                    <a:tint val="75000"/>
+                  </a:schemeClr>
+                </a:solidFill>
+                <a:latin typeface="+mn-lt"/>
+                <a:ea typeface="+mn-ea"/>
+                <a:cs typeface="+mn-cs"/>
+              </a:defRPr>
+            </a:lvl7pPr>
+            <a:lvl8pPr marL="3200400" indent="0" algn="ctr" defTabSz="914400" rtl="0" eaLnBrk="1" latinLnBrk="0" hangingPunct="1">
+              <a:spcBef>
+                <a:spcPct val="20000"/>
+              </a:spcBef>
+              <a:buFont typeface="Arial" pitchFamily="34" charset="0"/>
+              <a:buNone/>
+              <a:defRPr sz="2000" kern="1200">
+                <a:solidFill>
+                  <a:schemeClr val="tx1">
+                    <a:tint val="75000"/>
+                  </a:schemeClr>
+                </a:solidFill>
+                <a:latin typeface="+mn-lt"/>
+                <a:ea typeface="+mn-ea"/>
+                <a:cs typeface="+mn-cs"/>
+              </a:defRPr>
+            </a:lvl8pPr>
+            <a:lvl9pPr marL="3657600" indent="0" algn="ctr" defTabSz="914400" rtl="0" eaLnBrk="1" latinLnBrk="0" hangingPunct="1">
+              <a:spcBef>
+                <a:spcPct val="20000"/>
+              </a:spcBef>
+              <a:buFont typeface="Arial" pitchFamily="34" charset="0"/>
+              <a:buNone/>
+              <a:defRPr sz="2000" kern="1200">
+                <a:solidFill>
+                  <a:schemeClr val="tx1">
+                    <a:tint val="75000"/>
+                  </a:schemeClr>
+                </a:solidFill>
+                <a:latin typeface="+mn-lt"/>
+                <a:ea typeface="+mn-ea"/>
+                <a:cs typeface="+mn-cs"/>
+              </a:defRPr>
+            </a:lvl9pPr>
+          </a:lstStyle>
+          <a:p>
+            <a:pPr lvl="1"/>
+            <a:endParaRPr lang="de-DE" sz="1600" dirty="0"/>
+          </a:p>
+        </p:txBody>
+      </p:sp>
+      <p:sp>
+        <p:nvSpPr>
+          <p:cNvPr id="9" name="Rechteck 8"/>
+          <p:cNvSpPr/>
+          <p:nvPr/>
+        </p:nvSpPr>
+        <p:spPr>
+          <a:xfrm>
+            <a:off x="457200" y="1608460"/>
+            <a:ext cx="8229600" cy="4524315"/>
+          </a:xfrm>
+          <a:prstGeom prst="rect">
+            <a:avLst/>
+          </a:prstGeom>
+        </p:spPr>
+        <p:txBody>
+          <a:bodyPr wrap="square">
+            <a:spAutoFit/>
+          </a:bodyPr>
+          <a:lstStyle/>
+          <a:p>
+            <a:r>
+              <a:rPr lang="de-DE" sz="2400" b="1" dirty="0" smtClean="0">
+                <a:latin typeface="Arial" panose="020B0604020202020204" pitchFamily="34" charset="0"/>
+                <a:cs typeface="Arial" panose="020B0604020202020204" pitchFamily="34" charset="0"/>
+              </a:rPr>
+              <a:t>Herausforderungen:</a:t>
+            </a:r>
+          </a:p>
+          <a:p>
+            <a:endParaRPr lang="de-DE" sz="2400" dirty="0" smtClean="0">
+              <a:latin typeface="Arial" panose="020B0604020202020204" pitchFamily="34" charset="0"/>
+              <a:cs typeface="Arial" panose="020B0604020202020204" pitchFamily="34" charset="0"/>
+            </a:endParaRPr>
+          </a:p>
+          <a:p>
+            <a:pPr marL="342900" indent="-342900">
+              <a:buFont typeface="Symbol" panose="05050102010706020507" pitchFamily="18" charset="2"/>
+              <a:buChar char="-"/>
+            </a:pPr>
+            <a:r>
+              <a:rPr lang="de-DE" sz="2400" dirty="0" smtClean="0">
+                <a:latin typeface="Arial" panose="020B0604020202020204" pitchFamily="34" charset="0"/>
+                <a:cs typeface="Arial" panose="020B0604020202020204" pitchFamily="34" charset="0"/>
+              </a:rPr>
+              <a:t>In Umfrage I haben nur knapp 20% der Teilnehmer angegeben, das sie mehr als eine Happy Hour pro Abend besuchen </a:t>
+            </a:r>
+          </a:p>
+          <a:p>
+            <a:pPr lvl="1"/>
+            <a:r>
+              <a:rPr lang="de-DE" sz="2400" dirty="0" smtClean="0">
+                <a:latin typeface="Arial" panose="020B0604020202020204" pitchFamily="34" charset="0"/>
+                <a:cs typeface="Arial" panose="020B0604020202020204" pitchFamily="34" charset="0"/>
+                <a:sym typeface="Wingdings" panose="05000000000000000000" pitchFamily="2" charset="2"/>
+              </a:rPr>
+              <a:t> Unserer Marketingaktivitäten müssen dazu animieren mehr als eine Happy-Hour zu besuchen</a:t>
+            </a:r>
+          </a:p>
+          <a:p>
+            <a:endParaRPr lang="de-DE" sz="2400" dirty="0">
+              <a:latin typeface="Arial" panose="020B0604020202020204" pitchFamily="34" charset="0"/>
+              <a:cs typeface="Arial" panose="020B0604020202020204" pitchFamily="34" charset="0"/>
+              <a:sym typeface="Wingdings" panose="05000000000000000000" pitchFamily="2" charset="2"/>
+            </a:endParaRPr>
+          </a:p>
+          <a:p>
+            <a:pPr marL="342900" indent="-342900">
+              <a:buFont typeface="Symbol" panose="05050102010706020507" pitchFamily="18" charset="2"/>
+              <a:buChar char="-"/>
+            </a:pPr>
+            <a:r>
+              <a:rPr lang="de-DE" sz="2400" dirty="0" smtClean="0">
+                <a:latin typeface="Arial" panose="020B0604020202020204" pitchFamily="34" charset="0"/>
+                <a:cs typeface="Arial" panose="020B0604020202020204" pitchFamily="34" charset="0"/>
+                <a:sym typeface="Wingdings" panose="05000000000000000000" pitchFamily="2" charset="2"/>
+              </a:rPr>
+              <a:t>Vordefinierte Routen sind sehr beliebt, das erstellen von eigenen Routen nach Umfrage I nicht</a:t>
+            </a:r>
+          </a:p>
+          <a:p>
+            <a:pPr lvl="1"/>
+            <a:r>
+              <a:rPr lang="de-DE" sz="2400" dirty="0" smtClean="0">
+                <a:latin typeface="Arial" panose="020B0604020202020204" pitchFamily="34" charset="0"/>
+                <a:cs typeface="Arial" panose="020B0604020202020204" pitchFamily="34" charset="0"/>
+                <a:sym typeface="Wingdings" panose="05000000000000000000" pitchFamily="2" charset="2"/>
+              </a:rPr>
+              <a:t> Die Vorteile der eigenen Routen und der Sharing Funktion müssen den Nutzern aufgezeigt werden</a:t>
+            </a:r>
+            <a:endParaRPr lang="de-DE" sz="2400" dirty="0"/>
+          </a:p>
+        </p:txBody>
+      </p:sp>
+    </p:spTree>
+    <p:extLst>
+      <p:ext uri="{BB962C8B-B14F-4D97-AF65-F5344CB8AC3E}">
+        <p14:creationId xmlns:p14="http://schemas.microsoft.com/office/powerpoint/2010/main" val="3224938422"/>
+      </p:ext>
+    </p:extLst>
+  </p:cSld>
+  <p:clrMapOvr>
+    <a:masterClrMapping/>
+  </p:clrMapOvr>
+  <p:timing>
+    <p:tnLst>
+      <p:par>
+        <p:cTn id="1" dur="indefinite" restart="never" nodeType="tmRoot"/>
+      </p:par>
+    </p:tnLst>
+  </p:timing>
+</p:sld>
+</file>
+
+<file path=ppt/slides/slide16.xml><?xml version="1.0" encoding="utf-8"?>
+<p:sld xmlns:a="http://schemas.openxmlformats.org/drawingml/2006/main" xmlns:r="http://schemas.openxmlformats.org/officeDocument/2006/relationships" xmlns:p="http://schemas.openxmlformats.org/presentationml/2006/main">
+  <p:cSld>
+    <p:spTree>
+      <p:nvGrpSpPr>
+        <p:cNvPr id="1" name=""/>
+        <p:cNvGrpSpPr/>
+        <p:nvPr/>
+      </p:nvGrpSpPr>
+      <p:grpSpPr>
+        <a:xfrm>
+          <a:off x="0" y="0"/>
+          <a:ext cx="0" cy="0"/>
+          <a:chOff x="0" y="0"/>
+          <a:chExt cx="0" cy="0"/>
+        </a:xfrm>
+      </p:grpSpPr>
+      <p:sp>
+        <p:nvSpPr>
+          <p:cNvPr id="4" name="Foliennummernplatzhalter 3"/>
+          <p:cNvSpPr>
+            <a:spLocks noGrp="1"/>
+          </p:cNvSpPr>
+          <p:nvPr>
+            <p:ph type="sldNum" sz="quarter" idx="12"/>
+          </p:nvPr>
+        </p:nvSpPr>
+        <p:spPr/>
+        <p:txBody>
+          <a:bodyPr/>
+          <a:lstStyle/>
+          <a:p>
+            <a:fld id="{6C6AE60A-B69C-4790-82F7-3882EDF23186}" type="slidenum">
+              <a:rPr lang="de-DE" smtClean="0"/>
+              <a:t>16</a:t>
+            </a:fld>
+            <a:endParaRPr lang="de-DE"/>
+          </a:p>
+        </p:txBody>
+      </p:sp>
+      <p:sp>
+        <p:nvSpPr>
+          <p:cNvPr id="5" name="Titel 1"/>
+          <p:cNvSpPr txBox="1">
+            <a:spLocks/>
+          </p:cNvSpPr>
+          <p:nvPr/>
+        </p:nvSpPr>
+        <p:spPr>
+          <a:xfrm>
+            <a:off x="457200" y="274638"/>
+            <a:ext cx="8229600" cy="1143000"/>
+          </a:xfrm>
+          <a:prstGeom prst="rect">
+            <a:avLst/>
+          </a:prstGeom>
+        </p:spPr>
+        <p:txBody>
+          <a:bodyPr vert="horz" lIns="91440" tIns="45720" rIns="91440" bIns="45720" rtlCol="0" anchor="ctr">
+            <a:normAutofit/>
+          </a:bodyPr>
+          <a:lstStyle>
+            <a:lvl1pPr algn="ctr" defTabSz="914400" rtl="0" eaLnBrk="1" latinLnBrk="0" hangingPunct="1">
+              <a:spcBef>
+                <a:spcPct val="0"/>
+              </a:spcBef>
+              <a:buNone/>
+              <a:defRPr sz="4400" kern="1200">
+                <a:solidFill>
+                  <a:schemeClr val="tx1"/>
+                </a:solidFill>
+                <a:latin typeface="+mj-lt"/>
+                <a:ea typeface="+mj-ea"/>
+                <a:cs typeface="+mj-cs"/>
+              </a:defRPr>
+            </a:lvl1pPr>
+          </a:lstStyle>
+          <a:p>
+            <a:pPr algn="l"/>
+            <a:r>
+              <a:rPr lang="de-DE" sz="2800" b="1" dirty="0" smtClean="0">
+                <a:latin typeface="Arial" panose="020B0604020202020204" pitchFamily="34" charset="0"/>
+                <a:cs typeface="Arial" panose="020B0604020202020204" pitchFamily="34" charset="0"/>
+              </a:rPr>
+              <a:t>3. </a:t>
+            </a:r>
+            <a:r>
+              <a:rPr lang="de-DE" sz="2800" b="1" dirty="0" smtClean="0">
+                <a:latin typeface="Arial" panose="020B0604020202020204" pitchFamily="34" charset="0"/>
+                <a:cs typeface="Arial" panose="020B0604020202020204" pitchFamily="34" charset="0"/>
+              </a:rPr>
+              <a:t>Social Media Strategie</a:t>
+            </a:r>
+            <a:endParaRPr lang="de-DE" sz="2800" dirty="0">
+              <a:latin typeface="Arial" panose="020B0604020202020204" pitchFamily="34" charset="0"/>
+              <a:cs typeface="Arial" panose="020B0604020202020204" pitchFamily="34" charset="0"/>
+            </a:endParaRPr>
+          </a:p>
+        </p:txBody>
+      </p:sp>
+      <p:sp>
+        <p:nvSpPr>
+          <p:cNvPr id="8" name="Inhaltsplatzhalter 5"/>
+          <p:cNvSpPr txBox="1">
+            <a:spLocks/>
+          </p:cNvSpPr>
+          <p:nvPr/>
+        </p:nvSpPr>
+        <p:spPr>
+          <a:xfrm>
+            <a:off x="457200" y="1600200"/>
+            <a:ext cx="8229600" cy="4525963"/>
+          </a:xfrm>
+          <a:prstGeom prst="rect">
+            <a:avLst/>
+          </a:prstGeom>
+          <a:ln>
+            <a:solidFill>
+              <a:schemeClr val="accent1"/>
+            </a:solidFill>
+          </a:ln>
+        </p:spPr>
+        <p:txBody>
+          <a:bodyPr vert="horz" lIns="91440" tIns="45720" rIns="91440" bIns="45720" rtlCol="0">
+            <a:normAutofit/>
+          </a:bodyPr>
+          <a:lstStyle>
+            <a:lvl1pPr marL="0" indent="0" algn="ctr" defTabSz="914400" rtl="0" eaLnBrk="1" latinLnBrk="0" hangingPunct="1">
+              <a:spcBef>
+                <a:spcPct val="20000"/>
+              </a:spcBef>
+              <a:buFont typeface="Arial" pitchFamily="34" charset="0"/>
+              <a:buNone/>
+              <a:defRPr sz="3200" kern="1200">
+                <a:solidFill>
+                  <a:schemeClr val="tx1">
+                    <a:tint val="75000"/>
+                  </a:schemeClr>
+                </a:solidFill>
+                <a:latin typeface="+mn-lt"/>
+                <a:ea typeface="+mn-ea"/>
+                <a:cs typeface="+mn-cs"/>
+              </a:defRPr>
+            </a:lvl1pPr>
+            <a:lvl2pPr marL="457200" indent="0" algn="ctr" defTabSz="914400" rtl="0" eaLnBrk="1" latinLnBrk="0" hangingPunct="1">
+              <a:spcBef>
+                <a:spcPct val="20000"/>
+              </a:spcBef>
+              <a:buFont typeface="Arial" pitchFamily="34" charset="0"/>
+              <a:buNone/>
+              <a:defRPr sz="2800" kern="1200">
+                <a:solidFill>
+                  <a:schemeClr val="tx1">
+                    <a:tint val="75000"/>
+                  </a:schemeClr>
+                </a:solidFill>
+                <a:latin typeface="+mn-lt"/>
+                <a:ea typeface="+mn-ea"/>
+                <a:cs typeface="+mn-cs"/>
+              </a:defRPr>
+            </a:lvl2pPr>
+            <a:lvl3pPr marL="914400" indent="0" algn="ctr" defTabSz="914400" rtl="0" eaLnBrk="1" latinLnBrk="0" hangingPunct="1">
+              <a:spcBef>
+                <a:spcPct val="20000"/>
+              </a:spcBef>
+              <a:buFont typeface="Arial" pitchFamily="34" charset="0"/>
+              <a:buNone/>
+              <a:defRPr sz="2400" kern="1200">
+                <a:solidFill>
+                  <a:schemeClr val="tx1">
+                    <a:tint val="75000"/>
+                  </a:schemeClr>
+                </a:solidFill>
+                <a:latin typeface="+mn-lt"/>
+                <a:ea typeface="+mn-ea"/>
+                <a:cs typeface="+mn-cs"/>
+              </a:defRPr>
+            </a:lvl3pPr>
+            <a:lvl4pPr marL="1371600" indent="0" algn="ctr" defTabSz="914400" rtl="0" eaLnBrk="1" latinLnBrk="0" hangingPunct="1">
+              <a:spcBef>
+                <a:spcPct val="20000"/>
+              </a:spcBef>
+              <a:buFont typeface="Arial" pitchFamily="34" charset="0"/>
+              <a:buNone/>
+              <a:defRPr sz="2000" kern="1200">
+                <a:solidFill>
+                  <a:schemeClr val="tx1">
+                    <a:tint val="75000"/>
+                  </a:schemeClr>
+                </a:solidFill>
+                <a:latin typeface="+mn-lt"/>
+                <a:ea typeface="+mn-ea"/>
+                <a:cs typeface="+mn-cs"/>
+              </a:defRPr>
+            </a:lvl4pPr>
+            <a:lvl5pPr marL="1828800" indent="0" algn="ctr" defTabSz="914400" rtl="0" eaLnBrk="1" latinLnBrk="0" hangingPunct="1">
+              <a:spcBef>
+                <a:spcPct val="20000"/>
+              </a:spcBef>
+              <a:buFont typeface="Arial" pitchFamily="34" charset="0"/>
+              <a:buNone/>
+              <a:defRPr sz="2000" kern="1200">
+                <a:solidFill>
+                  <a:schemeClr val="tx1">
+                    <a:tint val="75000"/>
+                  </a:schemeClr>
+                </a:solidFill>
+                <a:latin typeface="+mn-lt"/>
+                <a:ea typeface="+mn-ea"/>
+                <a:cs typeface="+mn-cs"/>
+              </a:defRPr>
+            </a:lvl5pPr>
+            <a:lvl6pPr marL="2286000" indent="0" algn="ctr" defTabSz="914400" rtl="0" eaLnBrk="1" latinLnBrk="0" hangingPunct="1">
+              <a:spcBef>
+                <a:spcPct val="20000"/>
+              </a:spcBef>
+              <a:buFont typeface="Arial" pitchFamily="34" charset="0"/>
+              <a:buNone/>
+              <a:defRPr sz="2000" kern="1200">
+                <a:solidFill>
+                  <a:schemeClr val="tx1">
+                    <a:tint val="75000"/>
+                  </a:schemeClr>
+                </a:solidFill>
+                <a:latin typeface="+mn-lt"/>
+                <a:ea typeface="+mn-ea"/>
+                <a:cs typeface="+mn-cs"/>
+              </a:defRPr>
+            </a:lvl6pPr>
+            <a:lvl7pPr marL="2743200" indent="0" algn="ctr" defTabSz="914400" rtl="0" eaLnBrk="1" latinLnBrk="0" hangingPunct="1">
+              <a:spcBef>
+                <a:spcPct val="20000"/>
+              </a:spcBef>
+              <a:buFont typeface="Arial" pitchFamily="34" charset="0"/>
+              <a:buNone/>
+              <a:defRPr sz="2000" kern="1200">
+                <a:solidFill>
+                  <a:schemeClr val="tx1">
+                    <a:tint val="75000"/>
+                  </a:schemeClr>
+                </a:solidFill>
+                <a:latin typeface="+mn-lt"/>
+                <a:ea typeface="+mn-ea"/>
+                <a:cs typeface="+mn-cs"/>
+              </a:defRPr>
+            </a:lvl7pPr>
+            <a:lvl8pPr marL="3200400" indent="0" algn="ctr" defTabSz="914400" rtl="0" eaLnBrk="1" latinLnBrk="0" hangingPunct="1">
+              <a:spcBef>
+                <a:spcPct val="20000"/>
+              </a:spcBef>
+              <a:buFont typeface="Arial" pitchFamily="34" charset="0"/>
+              <a:buNone/>
+              <a:defRPr sz="2000" kern="1200">
+                <a:solidFill>
+                  <a:schemeClr val="tx1">
+                    <a:tint val="75000"/>
+                  </a:schemeClr>
+                </a:solidFill>
+                <a:latin typeface="+mn-lt"/>
+                <a:ea typeface="+mn-ea"/>
+                <a:cs typeface="+mn-cs"/>
+              </a:defRPr>
+            </a:lvl8pPr>
+            <a:lvl9pPr marL="3657600" indent="0" algn="ctr" defTabSz="914400" rtl="0" eaLnBrk="1" latinLnBrk="0" hangingPunct="1">
+              <a:spcBef>
+                <a:spcPct val="20000"/>
+              </a:spcBef>
+              <a:buFont typeface="Arial" pitchFamily="34" charset="0"/>
+              <a:buNone/>
+              <a:defRPr sz="2000" kern="1200">
+                <a:solidFill>
+                  <a:schemeClr val="tx1">
+                    <a:tint val="75000"/>
+                  </a:schemeClr>
+                </a:solidFill>
+                <a:latin typeface="+mn-lt"/>
+                <a:ea typeface="+mn-ea"/>
+                <a:cs typeface="+mn-cs"/>
+              </a:defRPr>
+            </a:lvl9pPr>
+          </a:lstStyle>
+          <a:p>
+            <a:pPr lvl="1"/>
+            <a:endParaRPr lang="de-DE" sz="1600" dirty="0"/>
+          </a:p>
+        </p:txBody>
+      </p:sp>
+      <p:sp>
+        <p:nvSpPr>
+          <p:cNvPr id="9" name="Rechteck 8"/>
+          <p:cNvSpPr/>
+          <p:nvPr/>
+        </p:nvSpPr>
+        <p:spPr>
+          <a:xfrm>
+            <a:off x="457200" y="1608460"/>
+            <a:ext cx="8229600" cy="4524315"/>
+          </a:xfrm>
+          <a:prstGeom prst="rect">
+            <a:avLst/>
+          </a:prstGeom>
+        </p:spPr>
+        <p:txBody>
+          <a:bodyPr wrap="square">
+            <a:spAutoFit/>
+          </a:bodyPr>
+          <a:lstStyle/>
+          <a:p>
+            <a:r>
+              <a:rPr lang="de-DE" sz="2400" b="1" dirty="0" smtClean="0">
+                <a:latin typeface="Arial" panose="020B0604020202020204" pitchFamily="34" charset="0"/>
+                <a:cs typeface="Arial" panose="020B0604020202020204" pitchFamily="34" charset="0"/>
+              </a:rPr>
+              <a:t>Aktionen:</a:t>
+            </a:r>
+          </a:p>
+          <a:p>
+            <a:endParaRPr lang="de-DE" sz="2400" b="1" dirty="0" smtClean="0">
+              <a:latin typeface="Arial" panose="020B0604020202020204" pitchFamily="34" charset="0"/>
+              <a:cs typeface="Arial" panose="020B0604020202020204" pitchFamily="34" charset="0"/>
+            </a:endParaRPr>
+          </a:p>
+          <a:p>
+            <a:pPr marL="342900" indent="-342900">
+              <a:buFont typeface="Symbol" panose="05050102010706020507" pitchFamily="18" charset="2"/>
+              <a:buChar char="-"/>
+            </a:pPr>
+            <a:r>
+              <a:rPr lang="de-DE" sz="2400" dirty="0" smtClean="0">
+                <a:latin typeface="Arial" panose="020B0604020202020204" pitchFamily="34" charset="0"/>
+                <a:cs typeface="Arial" panose="020B0604020202020204" pitchFamily="34" charset="0"/>
+              </a:rPr>
+              <a:t>Alle Social Media Aktionen werden unter dem #</a:t>
+            </a:r>
+            <a:r>
+              <a:rPr lang="de-DE" sz="2400" dirty="0" err="1" smtClean="0">
+                <a:latin typeface="Arial" panose="020B0604020202020204" pitchFamily="34" charset="0"/>
+                <a:cs typeface="Arial" panose="020B0604020202020204" pitchFamily="34" charset="0"/>
+              </a:rPr>
+              <a:t>goHappy</a:t>
+            </a:r>
+            <a:r>
+              <a:rPr lang="de-DE" sz="2400" dirty="0" smtClean="0">
+                <a:latin typeface="Arial" panose="020B0604020202020204" pitchFamily="34" charset="0"/>
+                <a:cs typeface="Arial" panose="020B0604020202020204" pitchFamily="34" charset="0"/>
+              </a:rPr>
+              <a:t> zusammengefasst und auf den Plattformen </a:t>
+            </a:r>
+            <a:r>
+              <a:rPr lang="de-DE" sz="2400" dirty="0" err="1" smtClean="0">
+                <a:latin typeface="Arial" panose="020B0604020202020204" pitchFamily="34" charset="0"/>
+                <a:cs typeface="Arial" panose="020B0604020202020204" pitchFamily="34" charset="0"/>
+              </a:rPr>
+              <a:t>Facbeook</a:t>
+            </a:r>
+            <a:r>
+              <a:rPr lang="de-DE" sz="2400" dirty="0" smtClean="0">
+                <a:latin typeface="Arial" panose="020B0604020202020204" pitchFamily="34" charset="0"/>
+                <a:cs typeface="Arial" panose="020B0604020202020204" pitchFamily="34" charset="0"/>
+              </a:rPr>
+              <a:t> und Instagram parallel durchgeführt.</a:t>
+            </a:r>
+          </a:p>
+          <a:p>
+            <a:endParaRPr lang="de-DE" sz="2400" dirty="0" smtClean="0">
+              <a:latin typeface="Arial" panose="020B0604020202020204" pitchFamily="34" charset="0"/>
+              <a:cs typeface="Arial" panose="020B0604020202020204" pitchFamily="34" charset="0"/>
+            </a:endParaRPr>
+          </a:p>
+          <a:p>
+            <a:pPr marL="457200" indent="-457200">
+              <a:buFont typeface="Symbol" panose="05050102010706020507" pitchFamily="18" charset="2"/>
+              <a:buChar char="-"/>
+            </a:pPr>
+            <a:r>
+              <a:rPr lang="de-DE" sz="2400" i="1" dirty="0">
+                <a:latin typeface="Arial" panose="020B0604020202020204" pitchFamily="34" charset="0"/>
+                <a:cs typeface="Arial" panose="020B0604020202020204" pitchFamily="34" charset="0"/>
+              </a:rPr>
+              <a:t>Was macht dich happy? Schreib uns auf </a:t>
+            </a:r>
+            <a:r>
+              <a:rPr lang="de-DE" sz="2400" i="1" dirty="0" smtClean="0">
+                <a:latin typeface="Arial" panose="020B0604020202020204" pitchFamily="34" charset="0"/>
+                <a:cs typeface="Arial" panose="020B0604020202020204" pitchFamily="34" charset="0"/>
+              </a:rPr>
+              <a:t>Facebook oder Instagram unter </a:t>
+            </a:r>
+            <a:r>
+              <a:rPr lang="de-DE" sz="2400" i="1" dirty="0">
+                <a:latin typeface="Arial" panose="020B0604020202020204" pitchFamily="34" charset="0"/>
+                <a:cs typeface="Arial" panose="020B0604020202020204" pitchFamily="34" charset="0"/>
+              </a:rPr>
+              <a:t>dem Hashtag </a:t>
+            </a:r>
+            <a:r>
+              <a:rPr lang="de-DE" sz="2400" i="1" dirty="0" smtClean="0">
+                <a:latin typeface="Arial" panose="020B0604020202020204" pitchFamily="34" charset="0"/>
+                <a:cs typeface="Arial" panose="020B0604020202020204" pitchFamily="34" charset="0"/>
+              </a:rPr>
+              <a:t>#</a:t>
+            </a:r>
+            <a:r>
+              <a:rPr lang="de-DE" sz="2400" i="1" dirty="0" err="1" smtClean="0">
+                <a:latin typeface="Arial" panose="020B0604020202020204" pitchFamily="34" charset="0"/>
+                <a:cs typeface="Arial" panose="020B0604020202020204" pitchFamily="34" charset="0"/>
+              </a:rPr>
+              <a:t>goHappy</a:t>
+            </a:r>
+            <a:endParaRPr lang="de-DE" sz="2400" i="1" dirty="0" smtClean="0">
+              <a:latin typeface="Arial" panose="020B0604020202020204" pitchFamily="34" charset="0"/>
+              <a:cs typeface="Arial" panose="020B0604020202020204" pitchFamily="34" charset="0"/>
+            </a:endParaRPr>
+          </a:p>
+          <a:p>
+            <a:endParaRPr lang="de-DE" sz="2400" dirty="0">
+              <a:latin typeface="Arial" panose="020B0604020202020204" pitchFamily="34" charset="0"/>
+              <a:cs typeface="Arial" panose="020B0604020202020204" pitchFamily="34" charset="0"/>
+            </a:endParaRPr>
+          </a:p>
+          <a:p>
+            <a:pPr marL="342900" indent="-342900">
+              <a:buFont typeface="Symbol" panose="05050102010706020507" pitchFamily="18" charset="2"/>
+              <a:buChar char="-"/>
+            </a:pPr>
+            <a:r>
+              <a:rPr lang="de-DE" sz="2400" i="1" dirty="0">
+                <a:latin typeface="Arial" panose="020B0604020202020204" pitchFamily="34" charset="0"/>
+                <a:cs typeface="Arial" panose="020B0604020202020204" pitchFamily="34" charset="0"/>
+              </a:rPr>
+              <a:t>Du bist mit </a:t>
+            </a:r>
+            <a:r>
+              <a:rPr lang="de-DE" sz="2400" i="1" dirty="0" err="1" smtClean="0">
+                <a:latin typeface="Arial" panose="020B0604020202020204" pitchFamily="34" charset="0"/>
+                <a:cs typeface="Arial" panose="020B0604020202020204" pitchFamily="34" charset="0"/>
+              </a:rPr>
+              <a:t>GoHappy</a:t>
+            </a:r>
+            <a:r>
+              <a:rPr lang="de-DE" sz="2400" i="1" dirty="0" smtClean="0">
+                <a:latin typeface="Arial" panose="020B0604020202020204" pitchFamily="34" charset="0"/>
+                <a:cs typeface="Arial" panose="020B0604020202020204" pitchFamily="34" charset="0"/>
+              </a:rPr>
+              <a:t> </a:t>
+            </a:r>
+            <a:r>
+              <a:rPr lang="de-DE" sz="2400" i="1" dirty="0">
+                <a:latin typeface="Arial" panose="020B0604020202020204" pitchFamily="34" charset="0"/>
+                <a:cs typeface="Arial" panose="020B0604020202020204" pitchFamily="34" charset="0"/>
+              </a:rPr>
+              <a:t>unterwegs? Teile deine Erlebnisse und Fotos mit </a:t>
+            </a:r>
+            <a:r>
+              <a:rPr lang="de-DE" sz="2400" i="1" dirty="0" smtClean="0">
+                <a:latin typeface="Arial" panose="020B0604020202020204" pitchFamily="34" charset="0"/>
+                <a:cs typeface="Arial" panose="020B0604020202020204" pitchFamily="34" charset="0"/>
+              </a:rPr>
+              <a:t>deinen Freunden unter dem #</a:t>
+            </a:r>
+            <a:r>
+              <a:rPr lang="de-DE" sz="2400" i="1" dirty="0" err="1" smtClean="0">
+                <a:latin typeface="Arial" panose="020B0604020202020204" pitchFamily="34" charset="0"/>
+                <a:cs typeface="Arial" panose="020B0604020202020204" pitchFamily="34" charset="0"/>
+              </a:rPr>
+              <a:t>goHappy</a:t>
+            </a:r>
+            <a:endParaRPr lang="de-DE" sz="2400" i="1" dirty="0">
+              <a:latin typeface="Arial" panose="020B0604020202020204" pitchFamily="34" charset="0"/>
+              <a:cs typeface="Arial" panose="020B0604020202020204" pitchFamily="34" charset="0"/>
+            </a:endParaRPr>
+          </a:p>
+          <a:p>
+            <a:pPr marL="342900" indent="-342900">
+              <a:buFont typeface="Symbol" panose="05050102010706020507" pitchFamily="18" charset="2"/>
+              <a:buChar char="-"/>
+            </a:pPr>
+            <a:endParaRPr lang="de-DE" sz="2400" dirty="0"/>
+          </a:p>
+        </p:txBody>
+      </p:sp>
+    </p:spTree>
+    <p:extLst>
+      <p:ext uri="{BB962C8B-B14F-4D97-AF65-F5344CB8AC3E}">
+        <p14:creationId xmlns:p14="http://schemas.microsoft.com/office/powerpoint/2010/main" val="3096465287"/>
+      </p:ext>
+    </p:extLst>
+  </p:cSld>
+  <p:clrMapOvr>
+    <a:masterClrMapping/>
+  </p:clrMapOvr>
+  <p:timing>
+    <p:tnLst>
+      <p:par>
+        <p:cTn id="1" dur="indefinite" restart="never" nodeType="tmRoot"/>
+      </p:par>
+    </p:tnLst>
+  </p:timing>
+</p:sld>
+</file>
+
+<file path=ppt/slides/slide17.xml><?xml version="1.0" encoding="utf-8"?>
+<p:sld xmlns:a="http://schemas.openxmlformats.org/drawingml/2006/main" xmlns:r="http://schemas.openxmlformats.org/officeDocument/2006/relationships" xmlns:p="http://schemas.openxmlformats.org/presentationml/2006/main">
+  <p:cSld>
+    <p:spTree>
+      <p:nvGrpSpPr>
+        <p:cNvPr id="1" name=""/>
+        <p:cNvGrpSpPr/>
+        <p:nvPr/>
+      </p:nvGrpSpPr>
+      <p:grpSpPr>
+        <a:xfrm>
+          <a:off x="0" y="0"/>
+          <a:ext cx="0" cy="0"/>
+          <a:chOff x="0" y="0"/>
+          <a:chExt cx="0" cy="0"/>
+        </a:xfrm>
+      </p:grpSpPr>
+      <p:sp>
+        <p:nvSpPr>
+          <p:cNvPr id="4" name="Foliennummernplatzhalter 3"/>
+          <p:cNvSpPr>
+            <a:spLocks noGrp="1"/>
+          </p:cNvSpPr>
+          <p:nvPr>
+            <p:ph type="sldNum" sz="quarter" idx="12"/>
+          </p:nvPr>
+        </p:nvSpPr>
+        <p:spPr/>
+        <p:txBody>
+          <a:bodyPr/>
+          <a:lstStyle/>
+          <a:p>
+            <a:fld id="{6C6AE60A-B69C-4790-82F7-3882EDF23186}" type="slidenum">
+              <a:rPr lang="de-DE" smtClean="0"/>
+              <a:t>17</a:t>
+            </a:fld>
+            <a:endParaRPr lang="de-DE"/>
+          </a:p>
+        </p:txBody>
+      </p:sp>
+      <p:sp>
+        <p:nvSpPr>
+          <p:cNvPr id="5" name="Titel 1"/>
+          <p:cNvSpPr txBox="1">
+            <a:spLocks/>
+          </p:cNvSpPr>
+          <p:nvPr/>
+        </p:nvSpPr>
+        <p:spPr>
+          <a:xfrm>
+            <a:off x="457200" y="274638"/>
+            <a:ext cx="8229600" cy="1143000"/>
+          </a:xfrm>
+          <a:prstGeom prst="rect">
+            <a:avLst/>
+          </a:prstGeom>
+        </p:spPr>
+        <p:txBody>
+          <a:bodyPr vert="horz" lIns="91440" tIns="45720" rIns="91440" bIns="45720" rtlCol="0" anchor="ctr">
+            <a:normAutofit/>
+          </a:bodyPr>
+          <a:lstStyle>
+            <a:lvl1pPr algn="ctr" defTabSz="914400" rtl="0" eaLnBrk="1" latinLnBrk="0" hangingPunct="1">
+              <a:spcBef>
+                <a:spcPct val="0"/>
+              </a:spcBef>
+              <a:buNone/>
+              <a:defRPr sz="4400" kern="1200">
+                <a:solidFill>
+                  <a:schemeClr val="tx1"/>
+                </a:solidFill>
+                <a:latin typeface="+mj-lt"/>
+                <a:ea typeface="+mj-ea"/>
+                <a:cs typeface="+mj-cs"/>
+              </a:defRPr>
+            </a:lvl1pPr>
+          </a:lstStyle>
+          <a:p>
+            <a:pPr algn="l"/>
+            <a:r>
+              <a:rPr lang="de-DE" sz="2800" b="1" dirty="0" smtClean="0">
+                <a:latin typeface="Arial" panose="020B0604020202020204" pitchFamily="34" charset="0"/>
+                <a:cs typeface="Arial" panose="020B0604020202020204" pitchFamily="34" charset="0"/>
+              </a:rPr>
+              <a:t>3. </a:t>
+            </a:r>
+            <a:r>
+              <a:rPr lang="de-DE" sz="2800" b="1" dirty="0" smtClean="0">
+                <a:latin typeface="Arial" panose="020B0604020202020204" pitchFamily="34" charset="0"/>
+                <a:cs typeface="Arial" panose="020B0604020202020204" pitchFamily="34" charset="0"/>
+              </a:rPr>
+              <a:t>Social Media Strategie</a:t>
+            </a:r>
+            <a:endParaRPr lang="de-DE" sz="2800" dirty="0">
+              <a:latin typeface="Arial" panose="020B0604020202020204" pitchFamily="34" charset="0"/>
+              <a:cs typeface="Arial" panose="020B0604020202020204" pitchFamily="34" charset="0"/>
+            </a:endParaRPr>
+          </a:p>
+        </p:txBody>
+      </p:sp>
+      <p:sp>
+        <p:nvSpPr>
+          <p:cNvPr id="8" name="Inhaltsplatzhalter 5"/>
+          <p:cNvSpPr txBox="1">
+            <a:spLocks/>
+          </p:cNvSpPr>
+          <p:nvPr/>
+        </p:nvSpPr>
+        <p:spPr>
+          <a:xfrm>
+            <a:off x="457200" y="1600200"/>
+            <a:ext cx="8229600" cy="4525963"/>
+          </a:xfrm>
+          <a:prstGeom prst="rect">
+            <a:avLst/>
+          </a:prstGeom>
+          <a:ln>
+            <a:solidFill>
+              <a:schemeClr val="accent1"/>
+            </a:solidFill>
+          </a:ln>
+        </p:spPr>
+        <p:txBody>
+          <a:bodyPr vert="horz" lIns="91440" tIns="45720" rIns="91440" bIns="45720" rtlCol="0">
+            <a:normAutofit/>
+          </a:bodyPr>
+          <a:lstStyle>
+            <a:lvl1pPr marL="0" indent="0" algn="ctr" defTabSz="914400" rtl="0" eaLnBrk="1" latinLnBrk="0" hangingPunct="1">
+              <a:spcBef>
+                <a:spcPct val="20000"/>
+              </a:spcBef>
+              <a:buFont typeface="Arial" pitchFamily="34" charset="0"/>
+              <a:buNone/>
+              <a:defRPr sz="3200" kern="1200">
+                <a:solidFill>
+                  <a:schemeClr val="tx1">
+                    <a:tint val="75000"/>
+                  </a:schemeClr>
+                </a:solidFill>
+                <a:latin typeface="+mn-lt"/>
+                <a:ea typeface="+mn-ea"/>
+                <a:cs typeface="+mn-cs"/>
+              </a:defRPr>
+            </a:lvl1pPr>
+            <a:lvl2pPr marL="457200" indent="0" algn="ctr" defTabSz="914400" rtl="0" eaLnBrk="1" latinLnBrk="0" hangingPunct="1">
+              <a:spcBef>
+                <a:spcPct val="20000"/>
+              </a:spcBef>
+              <a:buFont typeface="Arial" pitchFamily="34" charset="0"/>
+              <a:buNone/>
+              <a:defRPr sz="2800" kern="1200">
+                <a:solidFill>
+                  <a:schemeClr val="tx1">
+                    <a:tint val="75000"/>
+                  </a:schemeClr>
+                </a:solidFill>
+                <a:latin typeface="+mn-lt"/>
+                <a:ea typeface="+mn-ea"/>
+                <a:cs typeface="+mn-cs"/>
+              </a:defRPr>
+            </a:lvl2pPr>
+            <a:lvl3pPr marL="914400" indent="0" algn="ctr" defTabSz="914400" rtl="0" eaLnBrk="1" latinLnBrk="0" hangingPunct="1">
+              <a:spcBef>
+                <a:spcPct val="20000"/>
+              </a:spcBef>
+              <a:buFont typeface="Arial" pitchFamily="34" charset="0"/>
+              <a:buNone/>
+              <a:defRPr sz="2400" kern="1200">
+                <a:solidFill>
+                  <a:schemeClr val="tx1">
+                    <a:tint val="75000"/>
+                  </a:schemeClr>
+                </a:solidFill>
+                <a:latin typeface="+mn-lt"/>
+                <a:ea typeface="+mn-ea"/>
+                <a:cs typeface="+mn-cs"/>
+              </a:defRPr>
+            </a:lvl3pPr>
+            <a:lvl4pPr marL="1371600" indent="0" algn="ctr" defTabSz="914400" rtl="0" eaLnBrk="1" latinLnBrk="0" hangingPunct="1">
+              <a:spcBef>
+                <a:spcPct val="20000"/>
+              </a:spcBef>
+              <a:buFont typeface="Arial" pitchFamily="34" charset="0"/>
+              <a:buNone/>
+              <a:defRPr sz="2000" kern="1200">
+                <a:solidFill>
+                  <a:schemeClr val="tx1">
+                    <a:tint val="75000"/>
+                  </a:schemeClr>
+                </a:solidFill>
+                <a:latin typeface="+mn-lt"/>
+                <a:ea typeface="+mn-ea"/>
+                <a:cs typeface="+mn-cs"/>
+              </a:defRPr>
+            </a:lvl4pPr>
+            <a:lvl5pPr marL="1828800" indent="0" algn="ctr" defTabSz="914400" rtl="0" eaLnBrk="1" latinLnBrk="0" hangingPunct="1">
+              <a:spcBef>
+                <a:spcPct val="20000"/>
+              </a:spcBef>
+              <a:buFont typeface="Arial" pitchFamily="34" charset="0"/>
+              <a:buNone/>
+              <a:defRPr sz="2000" kern="1200">
+                <a:solidFill>
+                  <a:schemeClr val="tx1">
+                    <a:tint val="75000"/>
+                  </a:schemeClr>
+                </a:solidFill>
+                <a:latin typeface="+mn-lt"/>
+                <a:ea typeface="+mn-ea"/>
+                <a:cs typeface="+mn-cs"/>
+              </a:defRPr>
+            </a:lvl5pPr>
+            <a:lvl6pPr marL="2286000" indent="0" algn="ctr" defTabSz="914400" rtl="0" eaLnBrk="1" latinLnBrk="0" hangingPunct="1">
+              <a:spcBef>
+                <a:spcPct val="20000"/>
+              </a:spcBef>
+              <a:buFont typeface="Arial" pitchFamily="34" charset="0"/>
+              <a:buNone/>
+              <a:defRPr sz="2000" kern="1200">
+                <a:solidFill>
+                  <a:schemeClr val="tx1">
+                    <a:tint val="75000"/>
+                  </a:schemeClr>
+                </a:solidFill>
+                <a:latin typeface="+mn-lt"/>
+                <a:ea typeface="+mn-ea"/>
+                <a:cs typeface="+mn-cs"/>
+              </a:defRPr>
+            </a:lvl6pPr>
+            <a:lvl7pPr marL="2743200" indent="0" algn="ctr" defTabSz="914400" rtl="0" eaLnBrk="1" latinLnBrk="0" hangingPunct="1">
+              <a:spcBef>
+                <a:spcPct val="20000"/>
+              </a:spcBef>
+              <a:buFont typeface="Arial" pitchFamily="34" charset="0"/>
+              <a:buNone/>
+              <a:defRPr sz="2000" kern="1200">
+                <a:solidFill>
+                  <a:schemeClr val="tx1">
+                    <a:tint val="75000"/>
+                  </a:schemeClr>
+                </a:solidFill>
+                <a:latin typeface="+mn-lt"/>
+                <a:ea typeface="+mn-ea"/>
+                <a:cs typeface="+mn-cs"/>
+              </a:defRPr>
+            </a:lvl7pPr>
+            <a:lvl8pPr marL="3200400" indent="0" algn="ctr" defTabSz="914400" rtl="0" eaLnBrk="1" latinLnBrk="0" hangingPunct="1">
+              <a:spcBef>
+                <a:spcPct val="20000"/>
+              </a:spcBef>
+              <a:buFont typeface="Arial" pitchFamily="34" charset="0"/>
+              <a:buNone/>
+              <a:defRPr sz="2000" kern="1200">
+                <a:solidFill>
+                  <a:schemeClr val="tx1">
+                    <a:tint val="75000"/>
+                  </a:schemeClr>
+                </a:solidFill>
+                <a:latin typeface="+mn-lt"/>
+                <a:ea typeface="+mn-ea"/>
+                <a:cs typeface="+mn-cs"/>
+              </a:defRPr>
+            </a:lvl8pPr>
+            <a:lvl9pPr marL="3657600" indent="0" algn="ctr" defTabSz="914400" rtl="0" eaLnBrk="1" latinLnBrk="0" hangingPunct="1">
+              <a:spcBef>
+                <a:spcPct val="20000"/>
+              </a:spcBef>
+              <a:buFont typeface="Arial" pitchFamily="34" charset="0"/>
+              <a:buNone/>
+              <a:defRPr sz="2000" kern="1200">
+                <a:solidFill>
+                  <a:schemeClr val="tx1">
+                    <a:tint val="75000"/>
+                  </a:schemeClr>
+                </a:solidFill>
+                <a:latin typeface="+mn-lt"/>
+                <a:ea typeface="+mn-ea"/>
+                <a:cs typeface="+mn-cs"/>
+              </a:defRPr>
+            </a:lvl9pPr>
+          </a:lstStyle>
+          <a:p>
+            <a:pPr lvl="1"/>
+            <a:endParaRPr lang="de-DE" sz="1600" dirty="0"/>
+          </a:p>
+        </p:txBody>
+      </p:sp>
+      <p:sp>
+        <p:nvSpPr>
+          <p:cNvPr id="9" name="Rechteck 8"/>
+          <p:cNvSpPr/>
+          <p:nvPr/>
+        </p:nvSpPr>
+        <p:spPr>
+          <a:xfrm>
+            <a:off x="457200" y="1608460"/>
+            <a:ext cx="8229600" cy="3046988"/>
+          </a:xfrm>
+          <a:prstGeom prst="rect">
+            <a:avLst/>
+          </a:prstGeom>
+        </p:spPr>
+        <p:txBody>
+          <a:bodyPr wrap="square">
+            <a:spAutoFit/>
+          </a:bodyPr>
+          <a:lstStyle/>
+          <a:p>
+            <a:r>
+              <a:rPr lang="de-DE" sz="2400" b="1" dirty="0" smtClean="0">
+                <a:latin typeface="Arial" panose="020B0604020202020204" pitchFamily="34" charset="0"/>
+                <a:cs typeface="Arial" panose="020B0604020202020204" pitchFamily="34" charset="0"/>
+              </a:rPr>
+              <a:t>Aktionen:</a:t>
+            </a:r>
+          </a:p>
+          <a:p>
+            <a:endParaRPr lang="de-DE" sz="2400" dirty="0" smtClean="0">
+              <a:latin typeface="Arial" panose="020B0604020202020204" pitchFamily="34" charset="0"/>
+              <a:cs typeface="Arial" panose="020B0604020202020204" pitchFamily="34" charset="0"/>
+            </a:endParaRPr>
+          </a:p>
+          <a:p>
+            <a:pPr marL="342900" indent="-342900">
+              <a:buFont typeface="Symbol" panose="05050102010706020507" pitchFamily="18" charset="2"/>
+              <a:buChar char="-"/>
+            </a:pPr>
+            <a:r>
+              <a:rPr lang="de-DE" sz="2400" dirty="0" smtClean="0">
+                <a:latin typeface="Arial" panose="020B0604020202020204" pitchFamily="34" charset="0"/>
+                <a:cs typeface="Arial" panose="020B0604020202020204" pitchFamily="34" charset="0"/>
+              </a:rPr>
+              <a:t>Kooperationen mit Barbesitzern, welche auf Facebook oder Instagram aktiv sind mit </a:t>
+            </a:r>
+            <a:r>
+              <a:rPr lang="de-DE" sz="2400" dirty="0" smtClean="0">
+                <a:latin typeface="Arial" panose="020B0604020202020204" pitchFamily="34" charset="0"/>
+                <a:cs typeface="Arial" panose="020B0604020202020204" pitchFamily="34" charset="0"/>
+              </a:rPr>
+              <a:t>Spezialangeboten in den Bars für die Nutzer der Anwendung.</a:t>
+            </a:r>
+          </a:p>
+          <a:p>
+            <a:endParaRPr lang="de-DE" sz="2400" dirty="0">
+              <a:latin typeface="Arial" panose="020B0604020202020204" pitchFamily="34" charset="0"/>
+              <a:cs typeface="Arial" panose="020B0604020202020204" pitchFamily="34" charset="0"/>
+            </a:endParaRPr>
+          </a:p>
+          <a:p>
+            <a:endParaRPr lang="de-DE" sz="2400" dirty="0" smtClean="0">
+              <a:latin typeface="Arial" panose="020B0604020202020204" pitchFamily="34" charset="0"/>
+              <a:cs typeface="Arial" panose="020B0604020202020204" pitchFamily="34" charset="0"/>
+            </a:endParaRPr>
+          </a:p>
+          <a:p>
+            <a:endParaRPr lang="de-DE" sz="2400" dirty="0">
+              <a:latin typeface="Arial" panose="020B0604020202020204" pitchFamily="34" charset="0"/>
+              <a:cs typeface="Arial" panose="020B0604020202020204" pitchFamily="34" charset="0"/>
+            </a:endParaRPr>
+          </a:p>
+        </p:txBody>
+      </p:sp>
+    </p:spTree>
+    <p:extLst>
+      <p:ext uri="{BB962C8B-B14F-4D97-AF65-F5344CB8AC3E}">
+        <p14:creationId xmlns:p14="http://schemas.microsoft.com/office/powerpoint/2010/main" val="1092697275"/>
+      </p:ext>
+    </p:extLst>
+  </p:cSld>
+  <p:clrMapOvr>
+    <a:masterClrMapping/>
+  </p:clrMapOvr>
+  <p:timing>
+    <p:tnLst>
+      <p:par>
+        <p:cTn id="1" dur="indefinite" restart="never" nodeType="tmRoot"/>
+      </p:par>
+    </p:tnLst>
+  </p:timing>
+</p:sld>
+</file>
+
+<file path=ppt/slides/slide18.xml><?xml version="1.0" encoding="utf-8"?>
+<p:sld xmlns:a="http://schemas.openxmlformats.org/drawingml/2006/main" xmlns:r="http://schemas.openxmlformats.org/officeDocument/2006/relationships" xmlns:p="http://schemas.openxmlformats.org/presentationml/2006/main">
+  <p:cSld>
+    <p:spTree>
+      <p:nvGrpSpPr>
+        <p:cNvPr id="1" name=""/>
+        <p:cNvGrpSpPr/>
+        <p:nvPr/>
+      </p:nvGrpSpPr>
+      <p:grpSpPr>
+        <a:xfrm>
+          <a:off x="0" y="0"/>
+          <a:ext cx="0" cy="0"/>
+          <a:chOff x="0" y="0"/>
+          <a:chExt cx="0" cy="0"/>
+        </a:xfrm>
+      </p:grpSpPr>
+      <p:sp>
+        <p:nvSpPr>
           <p:cNvPr id="3" name="Inhaltsplatzhalter 2"/>
           <p:cNvSpPr>
             <a:spLocks noGrp="1"/>
@@ -5773,8 +7030,102 @@
                 <a:latin typeface="Arial" panose="020B0604020202020204" pitchFamily="34" charset="0"/>
                 <a:cs typeface="Arial" panose="020B0604020202020204" pitchFamily="34" charset="0"/>
               </a:rPr>
-              <a:t>???</a:t>
-            </a:r>
+              <a:t>Social Media Marketing für „</a:t>
+            </a:r>
+            <a:r>
+              <a:rPr lang="de-DE" sz="2400" dirty="0" err="1" smtClean="0">
+                <a:latin typeface="Arial" panose="020B0604020202020204" pitchFamily="34" charset="0"/>
+                <a:cs typeface="Arial" panose="020B0604020202020204" pitchFamily="34" charset="0"/>
+              </a:rPr>
+              <a:t>GoHappy</a:t>
+            </a:r>
+            <a:r>
+              <a:rPr lang="de-DE" sz="2400" dirty="0" smtClean="0">
+                <a:latin typeface="Arial" panose="020B0604020202020204" pitchFamily="34" charset="0"/>
+                <a:cs typeface="Arial" panose="020B0604020202020204" pitchFamily="34" charset="0"/>
+              </a:rPr>
+              <a:t>“ soll vor allem eine junge Zielgruppe ansprechen.</a:t>
+            </a:r>
+          </a:p>
+          <a:p>
+            <a:pPr>
+              <a:buFont typeface="Symbol" panose="05050102010706020507" pitchFamily="18" charset="2"/>
+              <a:buChar char="-"/>
+            </a:pPr>
+            <a:r>
+              <a:rPr lang="de-DE" sz="2400" dirty="0">
+                <a:latin typeface="Arial" panose="020B0604020202020204" pitchFamily="34" charset="0"/>
+                <a:cs typeface="Arial" panose="020B0604020202020204" pitchFamily="34" charset="0"/>
+              </a:rPr>
+              <a:t>Es soll eine eigenständige Facebook und Instagram Präsenz von „</a:t>
+            </a:r>
+            <a:r>
+              <a:rPr lang="de-DE" sz="2400" dirty="0" err="1">
+                <a:latin typeface="Arial" panose="020B0604020202020204" pitchFamily="34" charset="0"/>
+                <a:cs typeface="Arial" panose="020B0604020202020204" pitchFamily="34" charset="0"/>
+              </a:rPr>
+              <a:t>GoHappy</a:t>
+            </a:r>
+            <a:r>
+              <a:rPr lang="de-DE" sz="2400" dirty="0">
+                <a:latin typeface="Arial" panose="020B0604020202020204" pitchFamily="34" charset="0"/>
+                <a:cs typeface="Arial" panose="020B0604020202020204" pitchFamily="34" charset="0"/>
+              </a:rPr>
+              <a:t>“ </a:t>
+            </a:r>
+            <a:r>
+              <a:rPr lang="de-DE" sz="2400" dirty="0" smtClean="0">
+                <a:latin typeface="Arial" panose="020B0604020202020204" pitchFamily="34" charset="0"/>
+                <a:cs typeface="Arial" panose="020B0604020202020204" pitchFamily="34" charset="0"/>
+              </a:rPr>
+              <a:t>geben.</a:t>
+            </a:r>
+            <a:endParaRPr lang="de-DE" sz="2400" dirty="0">
+              <a:latin typeface="Arial" panose="020B0604020202020204" pitchFamily="34" charset="0"/>
+              <a:cs typeface="Arial" panose="020B0604020202020204" pitchFamily="34" charset="0"/>
+            </a:endParaRPr>
+          </a:p>
+          <a:p>
+            <a:pPr>
+              <a:buFont typeface="Symbol" panose="05050102010706020507" pitchFamily="18" charset="2"/>
+              <a:buChar char="-"/>
+            </a:pPr>
+            <a:r>
+              <a:rPr lang="de-DE" sz="2400" dirty="0" smtClean="0">
+                <a:latin typeface="Arial" panose="020B0604020202020204" pitchFamily="34" charset="0"/>
+                <a:cs typeface="Arial" panose="020B0604020202020204" pitchFamily="34" charset="0"/>
+              </a:rPr>
+              <a:t>Der Dialog mit und zwischen den Nutzern steht ganz im Vordergrund und bedient sich der Eigenheiten der gewählten sozialen Netzwerke.</a:t>
+            </a:r>
+          </a:p>
+          <a:p>
+            <a:pPr>
+              <a:buFont typeface="Symbol" panose="05050102010706020507" pitchFamily="18" charset="2"/>
+              <a:buChar char="-"/>
+            </a:pPr>
+            <a:r>
+              <a:rPr lang="de-DE" sz="2400" dirty="0" smtClean="0">
+                <a:latin typeface="Arial" panose="020B0604020202020204" pitchFamily="34" charset="0"/>
+                <a:cs typeface="Arial" panose="020B0604020202020204" pitchFamily="34" charset="0"/>
+              </a:rPr>
+              <a:t>Nutzer sollen animiert werden ihre Erlebnisse auf den Happy Hour Touren zu teilen. Dies dient gerade auf Social Media als Multiplikator.</a:t>
+            </a:r>
+          </a:p>
+          <a:p>
+            <a:pPr>
+              <a:buFont typeface="Symbol" panose="05050102010706020507" pitchFamily="18" charset="2"/>
+              <a:buChar char="-"/>
+            </a:pPr>
+            <a:endParaRPr lang="de-DE" sz="2400" dirty="0" smtClean="0">
+              <a:latin typeface="Arial" panose="020B0604020202020204" pitchFamily="34" charset="0"/>
+              <a:cs typeface="Arial" panose="020B0604020202020204" pitchFamily="34" charset="0"/>
+            </a:endParaRPr>
+          </a:p>
+          <a:p>
+            <a:pPr>
+              <a:buFont typeface="Symbol" panose="05050102010706020507" pitchFamily="18" charset="2"/>
+              <a:buChar char="-"/>
+            </a:pPr>
             <a:endParaRPr lang="de-DE" sz="2400" dirty="0">
               <a:latin typeface="Arial" panose="020B0604020202020204" pitchFamily="34" charset="0"/>
               <a:cs typeface="Arial" panose="020B0604020202020204" pitchFamily="34" charset="0"/>
@@ -5951,7 +7302,7 @@
           <a:p>
             <a:fld id="{6C6AE60A-B69C-4790-82F7-3882EDF23186}" type="slidenum">
               <a:rPr lang="de-DE" smtClean="0"/>
-              <a:t>15</a:t>
+              <a:t>18</a:t>
             </a:fld>
             <a:endParaRPr lang="de-DE"/>
           </a:p>
@@ -7760,7 +9111,7 @@
           </a:p>
           <a:p>
             <a:r>
-              <a:rPr lang="de-DE" sz="2400" smtClean="0">
+              <a:rPr lang="de-DE" sz="2400" dirty="0" smtClean="0">
                 <a:latin typeface="Arial" panose="020B0604020202020204" pitchFamily="34" charset="0"/>
                 <a:cs typeface="Arial" panose="020B0604020202020204" pitchFamily="34" charset="0"/>
               </a:rPr>
@@ -7963,6 +9314,13 @@
                 <a:cs typeface="Arial" panose="020B0604020202020204" pitchFamily="34" charset="0"/>
               </a:rPr>
               <a:t>Marketing: </a:t>
+            </a:r>
+            <a:r>
+              <a:rPr lang="de-DE" sz="2400" b="1" dirty="0" smtClean="0">
+                <a:latin typeface="Arial" panose="020B0604020202020204" pitchFamily="34" charset="0"/>
+                <a:cs typeface="Arial" panose="020B0604020202020204" pitchFamily="34" charset="0"/>
+              </a:rPr>
+              <a:t> </a:t>
             </a:r>
             <a:r>
               <a:rPr lang="de-DE" sz="2400" dirty="0" smtClean="0">
@@ -8384,7 +9742,7 @@
                 <a:latin typeface="Arial" panose="020B0604020202020204" pitchFamily="34" charset="0"/>
                 <a:cs typeface="Arial" panose="020B0604020202020204" pitchFamily="34" charset="0"/>
               </a:rPr>
-              <a:t>bezeichnen </a:t>
+              <a:t>bezeichnet </a:t>
             </a:r>
             <a:r>
               <a:rPr lang="de-DE" sz="2400" dirty="0">
@@ -8802,24 +10160,14 @@
             </a:r>
           </a:p>
           <a:p>
-            <a:pPr marL="0" indent="0">
-              <a:buNone/>
+            <a:pPr>
+              <a:buFont typeface="Symbol" panose="05050102010706020507" pitchFamily="18" charset="2"/>
+              <a:buChar char="-"/>
             </a:pPr>
-            <a:r>
-              <a:rPr lang="de-DE" sz="2400" dirty="0" smtClean="0">
-                <a:latin typeface="Arial" panose="020B0604020202020204" pitchFamily="34" charset="0"/>
-                <a:cs typeface="Arial" panose="020B0604020202020204" pitchFamily="34" charset="0"/>
-                <a:sym typeface="Wingdings" panose="05000000000000000000" pitchFamily="2" charset="2"/>
-              </a:rPr>
-              <a:t> </a:t>
-            </a:r>
-            <a:r>
-              <a:rPr lang="de-DE" sz="2400" dirty="0">
-                <a:latin typeface="Arial" panose="020B0604020202020204" pitchFamily="34" charset="0"/>
-                <a:cs typeface="Arial" panose="020B0604020202020204" pitchFamily="34" charset="0"/>
-              </a:rPr>
-              <a:t>Wichtigste Frage: Wo ist die Zielgruppe? Dort geht es hin!</a:t>
-            </a:r>
+            <a:endParaRPr lang="de-DE" sz="2400" dirty="0" smtClean="0">
+              <a:latin typeface="Arial" panose="020B0604020202020204" pitchFamily="34" charset="0"/>
+              <a:cs typeface="Arial" panose="020B0604020202020204" pitchFamily="34" charset="0"/>
+            </a:endParaRPr>
           </a:p>
           <a:p>
             <a:pPr marL="0" indent="0">
@@ -9297,14 +10645,7 @@
                 <a:latin typeface="Arial" panose="020B0604020202020204" pitchFamily="34" charset="0"/>
                 <a:cs typeface="Arial" panose="020B0604020202020204" pitchFamily="34" charset="0"/>
               </a:rPr>
-              <a:t>Zu beachten</a:t>
-            </a:r>
-            <a:r>
-              <a:rPr lang="de-DE" sz="2400" dirty="0">
-                <a:latin typeface="Arial" panose="020B0604020202020204" pitchFamily="34" charset="0"/>
-                <a:cs typeface="Arial" panose="020B0604020202020204" pitchFamily="34" charset="0"/>
-              </a:rPr>
-              <a:t>:</a:t>
+              <a:t>Zu beachten:</a:t>
             </a:r>
           </a:p>
           <a:p>
@@ -9614,6 +10955,9 @@
             </a:r>
           </a:p>
           <a:p>
+            <a:pPr marL="0" indent="0">
+              <a:buNone/>
+            </a:pPr>
             <a:r>
               <a:rPr lang="de-DE" sz="2400" dirty="0" smtClean="0">
                 <a:latin typeface="Arial" panose="020B0604020202020204" pitchFamily="34" charset="0"/>
@@ -9623,7 +10967,10 @@
             </a:r>
           </a:p>
           <a:p>
-            <a:pPr lvl="1"/>
+            <a:pPr>
+              <a:buFont typeface="Symbol" panose="05050102010706020507" pitchFamily="18" charset="2"/>
+              <a:buChar char="-"/>
+            </a:pPr>
             <a:r>
               <a:rPr lang="de-DE" sz="2400" dirty="0" smtClean="0">
                 <a:latin typeface="Arial" panose="020B0604020202020204" pitchFamily="34" charset="0"/>
@@ -9661,12 +11008,15 @@
             </a:r>
           </a:p>
           <a:p>
+            <a:pPr marL="0" indent="0">
+              <a:buNone/>
+            </a:pPr>
             <a:r>
               <a:rPr lang="de-DE" sz="2400" dirty="0" smtClean="0">
                 <a:latin typeface="Arial" panose="020B0604020202020204" pitchFamily="34" charset="0"/>
                 <a:cs typeface="Arial" panose="020B0604020202020204" pitchFamily="34" charset="0"/>
               </a:rPr>
-              <a:t>Beim SMM gibt es weitere </a:t>
+              <a:t>Beim SMM kommen weitere </a:t>
             </a:r>
             <a:r>
               <a:rPr lang="de-DE" sz="2400" dirty="0" err="1" smtClean="0">
@@ -9680,11 +11030,14 @@
                 <a:latin typeface="Arial" panose="020B0604020202020204" pitchFamily="34" charset="0"/>
                 <a:cs typeface="Arial" panose="020B0604020202020204" pitchFamily="34" charset="0"/>
               </a:rPr>
-              <a:t>:</a:t>
-            </a:r>
-          </a:p>
-          <a:p>
-            <a:pPr lvl="1"/>
+              <a:t> dazu:</a:t>
+            </a:r>
+          </a:p>
+          <a:p>
+            <a:pPr>
+              <a:buFont typeface="Symbol" panose="05050102010706020507" pitchFamily="18" charset="2"/>
+              <a:buChar char="-"/>
+            </a:pPr>
             <a:r>
               <a:rPr lang="de-DE" sz="2400" dirty="0" err="1" smtClean="0">
                 <a:latin typeface="Arial" panose="020B0604020202020204" pitchFamily="34" charset="0"/>
@@ -9729,7 +11082,10 @@
             </a:r>
           </a:p>
           <a:p>
-            <a:pPr lvl="1"/>
+            <a:pPr>
+              <a:buFont typeface="Symbol" panose="05050102010706020507" pitchFamily="18" charset="2"/>
+              <a:buChar char="-"/>
+            </a:pPr>
             <a:r>
               <a:rPr lang="de-DE" sz="2400" dirty="0" err="1" smtClean="0">
                 <a:latin typeface="Arial" panose="020B0604020202020204" pitchFamily="34" charset="0"/>
@@ -9746,7 +11102,10 @@
             </a:r>
           </a:p>
           <a:p>
-            <a:pPr lvl="1"/>
+            <a:pPr>
+              <a:buFont typeface="Symbol" panose="05050102010706020507" pitchFamily="18" charset="2"/>
+              <a:buChar char="-"/>
+            </a:pPr>
             <a:r>
               <a:rPr lang="de-DE" sz="2400" dirty="0" smtClean="0">
                 <a:latin typeface="Arial" panose="020B0604020202020204" pitchFamily="34" charset="0"/>
@@ -9756,13 +11115,16 @@
             </a:r>
           </a:p>
           <a:p>
-            <a:pPr lvl="1"/>
+            <a:pPr>
+              <a:buFont typeface="Symbol" panose="05050102010706020507" pitchFamily="18" charset="2"/>
+              <a:buChar char="-"/>
+            </a:pPr>
             <a:r>
               <a:rPr lang="de-DE" sz="2400" dirty="0" smtClean="0">
                 <a:latin typeface="Arial" panose="020B0604020202020204" pitchFamily="34" charset="0"/>
                 <a:cs typeface="Arial" panose="020B0604020202020204" pitchFamily="34" charset="0"/>
               </a:rPr>
-              <a:t>Public Voice (auch: Influencer) (Multiplikation, PR, Reputation)</a:t>
+              <a:t>Public Voice (auch: Influencer) (Multiplikation, PR)</a:t>
             </a:r>
           </a:p>
           <a:p>

</xml_diff>

<commit_message>
Version 1.1 SMM Konzept
</commit_message>
<xml_diff>
--- a/documents/marketing/Social Media Marketingkonzept/Marketingstrategie - Social Media (5.7).pptx
+++ b/documents/marketing/Social Media Marketingkonzept/Marketingstrategie - Social Media (5.7).pptx
@@ -6395,7 +6395,7 @@
         <p:spPr>
           <a:xfrm>
             <a:off x="457200" y="1608460"/>
-            <a:ext cx="8229600" cy="4524315"/>
+            <a:ext cx="8229600" cy="4154984"/>
           </a:xfrm>
           <a:prstGeom prst="rect">
             <a:avLst/>
@@ -6463,120 +6463,43 @@
             </a:r>
           </a:p>
           <a:p>
+            <a:pPr marL="342900" indent="-342900">
+              <a:buFont typeface="Symbol" panose="05050102010706020507" pitchFamily="18" charset="2"/>
+              <a:buChar char="-"/>
+            </a:pPr>
+            <a:endParaRPr lang="de-DE" sz="2400" dirty="0">
+              <a:latin typeface="Arial" panose="020B0604020202020204" pitchFamily="34" charset="0"/>
+              <a:cs typeface="Arial" panose="020B0604020202020204" pitchFamily="34" charset="0"/>
+            </a:endParaRPr>
+          </a:p>
+          <a:p>
+            <a:pPr marL="342900" indent="-342900">
+              <a:buFont typeface="Symbol" panose="05050102010706020507" pitchFamily="18" charset="2"/>
+              <a:buChar char="-"/>
+            </a:pPr>
+            <a:r>
+              <a:rPr lang="de-DE" sz="2400" dirty="0">
+                <a:latin typeface="Arial" panose="020B0604020202020204" pitchFamily="34" charset="0"/>
+                <a:cs typeface="Arial" panose="020B0604020202020204" pitchFamily="34" charset="0"/>
+              </a:rPr>
+              <a:t>Kooperationen mit Barbesitzern, welche auf Facebook oder Instagram aktiv sind mit Spezialangeboten in den Bars für die Nutzer der Anwendung.</a:t>
+            </a:r>
+          </a:p>
+          <a:p>
+            <a:pPr marL="342900" indent="-342900">
+              <a:buFont typeface="Symbol" panose="05050102010706020507" pitchFamily="18" charset="2"/>
+              <a:buChar char="-"/>
+            </a:pPr>
             <a:endParaRPr lang="de-DE" sz="2400" dirty="0" smtClean="0">
               <a:latin typeface="Arial" panose="020B0604020202020204" pitchFamily="34" charset="0"/>
               <a:cs typeface="Arial" panose="020B0604020202020204" pitchFamily="34" charset="0"/>
             </a:endParaRPr>
           </a:p>
           <a:p>
-            <a:pPr marL="457200" indent="-457200">
-              <a:buFont typeface="Symbol" panose="05050102010706020507" pitchFamily="18" charset="2"/>
-              <a:buChar char="-"/>
-            </a:pPr>
-            <a:r>
-              <a:rPr lang="de-DE" sz="2400" i="1" dirty="0">
-                <a:latin typeface="Arial" panose="020B0604020202020204" pitchFamily="34" charset="0"/>
-                <a:cs typeface="Arial" panose="020B0604020202020204" pitchFamily="34" charset="0"/>
-              </a:rPr>
-              <a:t>Was macht dich happy? Schreib uns auf </a:t>
-            </a:r>
-            <a:r>
-              <a:rPr lang="de-DE" sz="2400" i="1" dirty="0" smtClean="0">
-                <a:latin typeface="Arial" panose="020B0604020202020204" pitchFamily="34" charset="0"/>
-                <a:cs typeface="Arial" panose="020B0604020202020204" pitchFamily="34" charset="0"/>
-              </a:rPr>
-              <a:t>Facebook oder Instagram unter </a:t>
-            </a:r>
-            <a:r>
-              <a:rPr lang="de-DE" sz="2400" i="1" dirty="0">
-                <a:latin typeface="Arial" panose="020B0604020202020204" pitchFamily="34" charset="0"/>
-                <a:cs typeface="Arial" panose="020B0604020202020204" pitchFamily="34" charset="0"/>
-              </a:rPr>
-              <a:t>dem Hashtag </a:t>
-            </a:r>
-            <a:r>
-              <a:rPr lang="de-DE" sz="2400" i="1" dirty="0" smtClean="0">
-                <a:latin typeface="Arial" panose="020B0604020202020204" pitchFamily="34" charset="0"/>
-                <a:cs typeface="Arial" panose="020B0604020202020204" pitchFamily="34" charset="0"/>
-              </a:rPr>
-              <a:t>#</a:t>
-            </a:r>
-            <a:r>
-              <a:rPr lang="de-DE" sz="2400" i="1" dirty="0" err="1" smtClean="0">
-                <a:latin typeface="Arial" panose="020B0604020202020204" pitchFamily="34" charset="0"/>
-                <a:cs typeface="Arial" panose="020B0604020202020204" pitchFamily="34" charset="0"/>
-              </a:rPr>
-              <a:t>goHappy</a:t>
-            </a:r>
-            <a:endParaRPr lang="de-DE" sz="2400" i="1" dirty="0" smtClean="0">
+            <a:endParaRPr lang="de-DE" sz="2400" dirty="0" smtClean="0">
               <a:latin typeface="Arial" panose="020B0604020202020204" pitchFamily="34" charset="0"/>
               <a:cs typeface="Arial" panose="020B0604020202020204" pitchFamily="34" charset="0"/>
             </a:endParaRPr>
-          </a:p>
-          <a:p>
-            <a:endParaRPr lang="de-DE" sz="2400" dirty="0">
-              <a:latin typeface="Arial" panose="020B0604020202020204" pitchFamily="34" charset="0"/>
-              <a:cs typeface="Arial" panose="020B0604020202020204" pitchFamily="34" charset="0"/>
-            </a:endParaRPr>
-          </a:p>
-          <a:p>
-            <a:pPr marL="342900" indent="-342900">
-              <a:buFont typeface="Symbol" panose="05050102010706020507" pitchFamily="18" charset="2"/>
-              <a:buChar char="-"/>
-            </a:pPr>
-            <a:r>
-              <a:rPr lang="de-DE" sz="2400" i="1" dirty="0">
-                <a:latin typeface="Arial" panose="020B0604020202020204" pitchFamily="34" charset="0"/>
-                <a:cs typeface="Arial" panose="020B0604020202020204" pitchFamily="34" charset="0"/>
-              </a:rPr>
-              <a:t>Du bist mit </a:t>
-            </a:r>
-            <a:r>
-              <a:rPr lang="de-DE" sz="2400" i="1" dirty="0" err="1" smtClean="0">
-                <a:latin typeface="Arial" panose="020B0604020202020204" pitchFamily="34" charset="0"/>
-                <a:cs typeface="Arial" panose="020B0604020202020204" pitchFamily="34" charset="0"/>
-              </a:rPr>
-              <a:t>GoHappy</a:t>
-            </a:r>
-            <a:r>
-              <a:rPr lang="de-DE" sz="2400" i="1" dirty="0" smtClean="0">
-                <a:latin typeface="Arial" panose="020B0604020202020204" pitchFamily="34" charset="0"/>
-                <a:cs typeface="Arial" panose="020B0604020202020204" pitchFamily="34" charset="0"/>
-              </a:rPr>
-              <a:t> </a:t>
-            </a:r>
-            <a:r>
-              <a:rPr lang="de-DE" sz="2400" i="1" dirty="0">
-                <a:latin typeface="Arial" panose="020B0604020202020204" pitchFamily="34" charset="0"/>
-                <a:cs typeface="Arial" panose="020B0604020202020204" pitchFamily="34" charset="0"/>
-              </a:rPr>
-              <a:t>unterwegs? Teile deine Erlebnisse und Fotos mit </a:t>
-            </a:r>
-            <a:r>
-              <a:rPr lang="de-DE" sz="2400" i="1" dirty="0" smtClean="0">
-                <a:latin typeface="Arial" panose="020B0604020202020204" pitchFamily="34" charset="0"/>
-                <a:cs typeface="Arial" panose="020B0604020202020204" pitchFamily="34" charset="0"/>
-              </a:rPr>
-              <a:t>deinen Freunden unter dem #</a:t>
-            </a:r>
-            <a:r>
-              <a:rPr lang="de-DE" sz="2400" i="1" dirty="0" err="1" smtClean="0">
-                <a:latin typeface="Arial" panose="020B0604020202020204" pitchFamily="34" charset="0"/>
-                <a:cs typeface="Arial" panose="020B0604020202020204" pitchFamily="34" charset="0"/>
-              </a:rPr>
-              <a:t>goHappy</a:t>
-            </a:r>
-            <a:endParaRPr lang="de-DE" sz="2400" i="1" dirty="0">
-              <a:latin typeface="Arial" panose="020B0604020202020204" pitchFamily="34" charset="0"/>
-              <a:cs typeface="Arial" panose="020B0604020202020204" pitchFamily="34" charset="0"/>
-            </a:endParaRPr>
-          </a:p>
-          <a:p>
-            <a:pPr marL="342900" indent="-342900">
-              <a:buFont typeface="Symbol" panose="05050102010706020507" pitchFamily="18" charset="2"/>
-              <a:buChar char="-"/>
-            </a:pPr>
-            <a:endParaRPr lang="de-DE" sz="2400" dirty="0"/>
           </a:p>
         </p:txBody>
       </p:sp>
@@ -6896,7 +6819,7 @@
         <p:spPr>
           <a:xfrm>
             <a:off x="457200" y="1608460"/>
-            <a:ext cx="8229600" cy="3046988"/>
+            <a:ext cx="8229600" cy="4893647"/>
           </a:xfrm>
           <a:prstGeom prst="rect">
             <a:avLst/>
@@ -6923,24 +6846,123 @@
             </a:endParaRPr>
           </a:p>
           <a:p>
+            <a:r>
+              <a:rPr lang="de-DE" sz="2400" dirty="0" smtClean="0">
+                <a:latin typeface="Arial" panose="020B0604020202020204" pitchFamily="34" charset="0"/>
+                <a:cs typeface="Arial" panose="020B0604020202020204" pitchFamily="34" charset="0"/>
+              </a:rPr>
+              <a:t>Potentielle </a:t>
+            </a:r>
+            <a:r>
+              <a:rPr lang="de-DE" sz="2400" dirty="0" err="1" smtClean="0">
+                <a:latin typeface="Arial" panose="020B0604020202020204" pitchFamily="34" charset="0"/>
+                <a:cs typeface="Arial" panose="020B0604020202020204" pitchFamily="34" charset="0"/>
+              </a:rPr>
+              <a:t>Postings</a:t>
+            </a:r>
+            <a:r>
+              <a:rPr lang="de-DE" sz="2400" dirty="0" smtClean="0">
+                <a:latin typeface="Arial" panose="020B0604020202020204" pitchFamily="34" charset="0"/>
+                <a:cs typeface="Arial" panose="020B0604020202020204" pitchFamily="34" charset="0"/>
+              </a:rPr>
+              <a:t>:</a:t>
+            </a:r>
+            <a:endParaRPr lang="de-DE" sz="2400" dirty="0" smtClean="0">
+              <a:latin typeface="Arial" panose="020B0604020202020204" pitchFamily="34" charset="0"/>
+              <a:cs typeface="Arial" panose="020B0604020202020204" pitchFamily="34" charset="0"/>
+            </a:endParaRPr>
+          </a:p>
+          <a:p>
+            <a:pPr marL="457200" indent="-457200">
+              <a:buFont typeface="Symbol" panose="05050102010706020507" pitchFamily="18" charset="2"/>
+              <a:buChar char="-"/>
+            </a:pPr>
+            <a:r>
+              <a:rPr lang="de-DE" sz="2400" i="1" dirty="0" smtClean="0">
+                <a:latin typeface="Arial" panose="020B0604020202020204" pitchFamily="34" charset="0"/>
+                <a:cs typeface="Arial" panose="020B0604020202020204" pitchFamily="34" charset="0"/>
+              </a:rPr>
+              <a:t>Was </a:t>
+            </a:r>
+            <a:r>
+              <a:rPr lang="de-DE" sz="2400" i="1" dirty="0">
+                <a:latin typeface="Arial" panose="020B0604020202020204" pitchFamily="34" charset="0"/>
+                <a:cs typeface="Arial" panose="020B0604020202020204" pitchFamily="34" charset="0"/>
+              </a:rPr>
+              <a:t>macht dich happy? Schreib uns auf Facebook oder Instagram unter dem Hashtag #</a:t>
+            </a:r>
+            <a:r>
+              <a:rPr lang="de-DE" sz="2400" i="1" dirty="0" err="1">
+                <a:latin typeface="Arial" panose="020B0604020202020204" pitchFamily="34" charset="0"/>
+                <a:cs typeface="Arial" panose="020B0604020202020204" pitchFamily="34" charset="0"/>
+              </a:rPr>
+              <a:t>goHappy</a:t>
+            </a:r>
+            <a:endParaRPr lang="de-DE" sz="2400" i="1" dirty="0">
+              <a:latin typeface="Arial" panose="020B0604020202020204" pitchFamily="34" charset="0"/>
+              <a:cs typeface="Arial" panose="020B0604020202020204" pitchFamily="34" charset="0"/>
+            </a:endParaRPr>
+          </a:p>
+          <a:p>
+            <a:endParaRPr lang="de-DE" sz="2400" dirty="0">
+              <a:latin typeface="Arial" panose="020B0604020202020204" pitchFamily="34" charset="0"/>
+              <a:cs typeface="Arial" panose="020B0604020202020204" pitchFamily="34" charset="0"/>
+            </a:endParaRPr>
+          </a:p>
+          <a:p>
             <a:pPr marL="342900" indent="-342900">
               <a:buFont typeface="Symbol" panose="05050102010706020507" pitchFamily="18" charset="2"/>
               <a:buChar char="-"/>
             </a:pPr>
             <a:r>
-              <a:rPr lang="de-DE" sz="2400" dirty="0" smtClean="0">
-                <a:latin typeface="Arial" panose="020B0604020202020204" pitchFamily="34" charset="0"/>
-                <a:cs typeface="Arial" panose="020B0604020202020204" pitchFamily="34" charset="0"/>
-              </a:rPr>
-              <a:t>Kooperationen mit Barbesitzern, welche auf Facebook oder Instagram aktiv sind mit </a:t>
-            </a:r>
-            <a:r>
-              <a:rPr lang="de-DE" sz="2400" dirty="0" smtClean="0">
-                <a:latin typeface="Arial" panose="020B0604020202020204" pitchFamily="34" charset="0"/>
-                <a:cs typeface="Arial" panose="020B0604020202020204" pitchFamily="34" charset="0"/>
-              </a:rPr>
-              <a:t>Spezialangeboten in den Bars für die Nutzer der Anwendung.</a:t>
-            </a:r>
+              <a:rPr lang="de-DE" sz="2400" i="1" dirty="0">
+                <a:latin typeface="Arial" panose="020B0604020202020204" pitchFamily="34" charset="0"/>
+                <a:cs typeface="Arial" panose="020B0604020202020204" pitchFamily="34" charset="0"/>
+              </a:rPr>
+              <a:t>Du bist mit </a:t>
+            </a:r>
+            <a:r>
+              <a:rPr lang="de-DE" sz="2400" i="1" dirty="0" err="1">
+                <a:latin typeface="Arial" panose="020B0604020202020204" pitchFamily="34" charset="0"/>
+                <a:cs typeface="Arial" panose="020B0604020202020204" pitchFamily="34" charset="0"/>
+              </a:rPr>
+              <a:t>GoHappy</a:t>
+            </a:r>
+            <a:r>
+              <a:rPr lang="de-DE" sz="2400" i="1" dirty="0">
+                <a:latin typeface="Arial" panose="020B0604020202020204" pitchFamily="34" charset="0"/>
+                <a:cs typeface="Arial" panose="020B0604020202020204" pitchFamily="34" charset="0"/>
+              </a:rPr>
+              <a:t> unterwegs? Teile deine Erlebnisse und Fotos mit deinen Freunden unter dem #</a:t>
+            </a:r>
+            <a:r>
+              <a:rPr lang="de-DE" sz="2400" i="1" dirty="0" err="1">
+                <a:latin typeface="Arial" panose="020B0604020202020204" pitchFamily="34" charset="0"/>
+                <a:cs typeface="Arial" panose="020B0604020202020204" pitchFamily="34" charset="0"/>
+              </a:rPr>
+              <a:t>goHappy</a:t>
+            </a:r>
+            <a:endParaRPr lang="de-DE" sz="2400" i="1" dirty="0">
+              <a:latin typeface="Arial" panose="020B0604020202020204" pitchFamily="34" charset="0"/>
+              <a:cs typeface="Arial" panose="020B0604020202020204" pitchFamily="34" charset="0"/>
+            </a:endParaRPr>
+          </a:p>
+          <a:p>
+            <a:pPr marL="342900" indent="-342900">
+              <a:buFont typeface="Symbol" panose="05050102010706020507" pitchFamily="18" charset="2"/>
+              <a:buChar char="-"/>
+            </a:pPr>
+            <a:endParaRPr lang="de-DE" sz="2400" dirty="0"/>
+          </a:p>
+          <a:p>
+            <a:pPr marL="342900" indent="-342900">
+              <a:buFont typeface="Symbol" panose="05050102010706020507" pitchFamily="18" charset="2"/>
+              <a:buChar char="-"/>
+            </a:pPr>
+            <a:endParaRPr lang="de-DE" sz="2400" dirty="0" smtClean="0">
+              <a:latin typeface="Arial" panose="020B0604020202020204" pitchFamily="34" charset="0"/>
+              <a:cs typeface="Arial" panose="020B0604020202020204" pitchFamily="34" charset="0"/>
+            </a:endParaRPr>
           </a:p>
           <a:p>
             <a:endParaRPr lang="de-DE" sz="2400" dirty="0">

</xml_diff>